<commit_message>
Rev 3 PWL losses push
push
</commit_message>
<xml_diff>
--- a/Ideal PWL Transient Losses Analysis/PWL Losses Analysis.pptx
+++ b/Ideal PWL Transient Losses Analysis/PWL Losses Analysis.pptx
@@ -20,7 +20,8 @@
     <p:sldId id="267" r:id="rId13"/>
     <p:sldId id="274" r:id="rId14"/>
     <p:sldId id="273" r:id="rId15"/>
-    <p:sldId id="269" r:id="rId16"/>
+    <p:sldId id="276" r:id="rId16"/>
+    <p:sldId id="269" r:id="rId17"/>
   </p:sldIdLst>
   <p:sldSz cx="12192000" cy="6858000"/>
   <p:notesSz cx="6858000" cy="9144000"/>
@@ -638,6 +639,62 @@
 </file>
 
 <file path=ppt/notesSlides/notesSlide12.xml><?xml version="1.0" encoding="utf-8"?>
+<p:notes xmlns:a="http://schemas.openxmlformats.org/drawingml/2006/main" xmlns:r="http://schemas.openxmlformats.org/officeDocument/2006/relationships" xmlns:p="http://schemas.openxmlformats.org/presentationml/2006/main">
+  <p:cSld>
+    <p:spTree>
+      <p:nvGrpSpPr>
+        <p:cNvPr id="1" name=""/>
+        <p:cNvGrpSpPr/>
+        <p:nvPr/>
+      </p:nvGrpSpPr>
+      <p:grpSpPr>
+        <a:xfrm>
+          <a:off x="0" y="0"/>
+          <a:ext cx="0" cy="0"/>
+          <a:chOff x="0" y="0"/>
+          <a:chExt cx="0" cy="0"/>
+        </a:xfrm>
+      </p:grpSpPr>
+      <p:sp>
+        <p:nvSpPr>
+          <p:cNvPr id="2" name="Slide Image Placeholder 1"/>
+          <p:cNvSpPr>
+            <a:spLocks noGrp="1" noRot="1" noChangeAspect="1"/>
+          </p:cNvSpPr>
+          <p:nvPr>
+            <p:ph type="sldImg" idx="2"/>
+          </p:nvPr>
+        </p:nvSpPr>
+        <p:spPr/>
+      </p:sp>
+      <p:sp>
+        <p:nvSpPr>
+          <p:cNvPr id="3" name="Text Placeholder 2"/>
+          <p:cNvSpPr>
+            <a:spLocks noGrp="1"/>
+          </p:cNvSpPr>
+          <p:nvPr>
+            <p:ph type="body" idx="3"/>
+          </p:nvPr>
+        </p:nvSpPr>
+        <p:spPr/>
+        <p:txBody>
+          <a:bodyPr/>
+          <a:lstStyle/>
+          <a:p>
+            <a:endParaRPr lang="en-US"/>
+          </a:p>
+        </p:txBody>
+      </p:sp>
+    </p:spTree>
+  </p:cSld>
+  <p:clrMapOvr>
+    <a:masterClrMapping/>
+  </p:clrMapOvr>
+</p:notes>
+</file>
+
+<file path=ppt/notesSlides/notesSlide13.xml><?xml version="1.0" encoding="utf-8"?>
 <p:notes xmlns:a="http://schemas.openxmlformats.org/drawingml/2006/main" xmlns:r="http://schemas.openxmlformats.org/officeDocument/2006/relationships" xmlns:p="http://schemas.openxmlformats.org/presentationml/2006/main">
   <p:cSld>
     <p:spTree>
@@ -4377,7 +4434,7 @@
                 <a:latin typeface="Arial" panose="020B0604020202020204" pitchFamily="34" charset="0"/>
                 <a:sym typeface="+mn-ea"/>
               </a:rPr>
-              <a:t>PWL SiC MOSFET Transient Losses Analysis in Qspice - Rev. 2</a:t>
+              <a:t>PWL SiC MOSFET Transient Losses Analysis in Qspice - Rev. 3</a:t>
             </a:r>
             <a:endParaRPr lang="en-US" altLang="en-US" sz="4800" b="1" dirty="0">
               <a:solidFill>
@@ -5336,6 +5393,299 @@
 </file>
 
 <file path=ppt/slides/slide13.xml><?xml version="1.0" encoding="utf-8"?>
+<p:sld xmlns:a="http://schemas.openxmlformats.org/drawingml/2006/main" xmlns:r="http://schemas.openxmlformats.org/officeDocument/2006/relationships" xmlns:p="http://schemas.openxmlformats.org/presentationml/2006/main">
+  <p:cSld>
+    <p:spTree>
+      <p:nvGrpSpPr>
+        <p:cNvPr id="1" name=""/>
+        <p:cNvGrpSpPr/>
+        <p:nvPr/>
+      </p:nvGrpSpPr>
+      <p:grpSpPr>
+        <a:xfrm>
+          <a:off x="0" y="0"/>
+          <a:ext cx="0" cy="0"/>
+          <a:chOff x="0" y="0"/>
+          <a:chExt cx="0" cy="0"/>
+        </a:xfrm>
+      </p:grpSpPr>
+      <p:sp>
+        <p:nvSpPr>
+          <p:cNvPr id="5" name="Title 4"/>
+          <p:cNvSpPr>
+            <a:spLocks noGrp="1"/>
+          </p:cNvSpPr>
+          <p:nvPr>
+            <p:ph type="title"/>
+          </p:nvPr>
+        </p:nvSpPr>
+        <p:spPr>
+          <a:xfrm>
+            <a:off x="838200" y="365125"/>
+            <a:ext cx="10515600" cy="619613"/>
+          </a:xfrm>
+        </p:spPr>
+        <p:txBody>
+          <a:bodyPr>
+            <a:normAutofit fontScale="90000"/>
+          </a:bodyPr>
+          <a:lstStyle/>
+          <a:p>
+            <a:r>
+              <a:rPr lang="en-US" dirty="0"/>
+              <a:t>Simulation test result (for Rev.3)</a:t>
+            </a:r>
+            <a:endParaRPr lang="en-US" dirty="0"/>
+          </a:p>
+        </p:txBody>
+      </p:sp>
+      <p:cxnSp>
+        <p:nvCxnSpPr>
+          <p:cNvPr id="8" name="Straight Connector 7"/>
+          <p:cNvCxnSpPr/>
+          <p:nvPr/>
+        </p:nvCxnSpPr>
+        <p:spPr>
+          <a:xfrm>
+            <a:off x="826474" y="940778"/>
+            <a:ext cx="10527326" cy="0"/>
+          </a:xfrm>
+          <a:prstGeom prst="line">
+            <a:avLst/>
+          </a:prstGeom>
+          <a:ln w="28575"/>
+        </p:spPr>
+        <p:style>
+          <a:lnRef idx="1">
+            <a:schemeClr val="accent1"/>
+          </a:lnRef>
+          <a:fillRef idx="0">
+            <a:schemeClr val="accent1"/>
+          </a:fillRef>
+          <a:effectRef idx="0">
+            <a:schemeClr val="accent1"/>
+          </a:effectRef>
+          <a:fontRef idx="minor">
+            <a:schemeClr val="tx1"/>
+          </a:fontRef>
+        </p:style>
+      </p:cxnSp>
+      <p:cxnSp>
+        <p:nvCxnSpPr>
+          <p:cNvPr id="9" name="Straight Connector 8"/>
+          <p:cNvCxnSpPr/>
+          <p:nvPr/>
+        </p:nvCxnSpPr>
+        <p:spPr>
+          <a:xfrm>
+            <a:off x="826474" y="368057"/>
+            <a:ext cx="10527326" cy="0"/>
+          </a:xfrm>
+          <a:prstGeom prst="line">
+            <a:avLst/>
+          </a:prstGeom>
+          <a:ln w="28575"/>
+        </p:spPr>
+        <p:style>
+          <a:lnRef idx="1">
+            <a:schemeClr val="accent1"/>
+          </a:lnRef>
+          <a:fillRef idx="0">
+            <a:schemeClr val="accent1"/>
+          </a:fillRef>
+          <a:effectRef idx="0">
+            <a:schemeClr val="accent1"/>
+          </a:effectRef>
+          <a:fontRef idx="minor">
+            <a:schemeClr val="tx1"/>
+          </a:fontRef>
+        </p:style>
+      </p:cxnSp>
+      <p:sp>
+        <p:nvSpPr>
+          <p:cNvPr id="7" name="Footer Placeholder 6"/>
+          <p:cNvSpPr>
+            <a:spLocks noGrp="1"/>
+          </p:cNvSpPr>
+          <p:nvPr>
+            <p:ph type="ftr" sz="quarter" idx="11"/>
+          </p:nvPr>
+        </p:nvSpPr>
+        <p:spPr/>
+        <p:txBody>
+          <a:bodyPr/>
+          <a:lstStyle/>
+          <a:p>
+            <a:r>
+              <a:rPr lang="en-US"/>
+              <a:t>By Arief Noor Rahman </a:t>
+            </a:r>
+            <a:r>
+              <a:rPr lang="en-US">
+                <a:latin typeface="SimSun" panose="02010600030101010101" pitchFamily="2" charset="-122"/>
+                <a:ea typeface="SimSun" panose="02010600030101010101" pitchFamily="2" charset="-122"/>
+              </a:rPr>
+              <a:t>－</a:t>
+            </a:r>
+            <a:r>
+              <a:rPr lang="en-US">
+                <a:sym typeface="+mn-ea"/>
+              </a:rPr>
+              <a:t>Power Control Design</a:t>
+            </a:r>
+            <a:endParaRPr lang="en-US">
+              <a:latin typeface="SimSun" panose="02010600030101010101" pitchFamily="2" charset="-122"/>
+              <a:ea typeface="SimSun" panose="02010600030101010101" pitchFamily="2" charset="-122"/>
+            </a:endParaRPr>
+          </a:p>
+        </p:txBody>
+      </p:sp>
+      <p:sp>
+        <p:nvSpPr>
+          <p:cNvPr id="3" name="Slide Number Placeholder 2"/>
+          <p:cNvSpPr>
+            <a:spLocks noGrp="1"/>
+          </p:cNvSpPr>
+          <p:nvPr>
+            <p:ph type="sldNum" sz="quarter" idx="12"/>
+          </p:nvPr>
+        </p:nvSpPr>
+        <p:spPr/>
+        <p:txBody>
+          <a:bodyPr/>
+          <a:lstStyle/>
+          <a:p>
+            <a:fld id="{9B618960-8005-486C-9A75-10CB2AAC16F9}" type="slidenum">
+              <a:rPr lang="en-US" smtClean="0"/>
+            </a:fld>
+            <a:endParaRPr lang="en-US"/>
+          </a:p>
+        </p:txBody>
+      </p:sp>
+      <p:pic>
+        <p:nvPicPr>
+          <p:cNvPr id="4" name="Picture 3" descr="logo_detail"/>
+          <p:cNvPicPr>
+            <a:picLocks noChangeAspect="1"/>
+          </p:cNvPicPr>
+          <p:nvPr/>
+        </p:nvPicPr>
+        <p:blipFill>
+          <a:blip r:embed="rId1"/>
+          <a:stretch>
+            <a:fillRect/>
+          </a:stretch>
+        </p:blipFill>
+        <p:spPr>
+          <a:xfrm>
+            <a:off x="120650" y="6024880"/>
+            <a:ext cx="696595" cy="696595"/>
+          </a:xfrm>
+          <a:prstGeom prst="rect">
+            <a:avLst/>
+          </a:prstGeom>
+        </p:spPr>
+      </p:pic>
+      <p:sp>
+        <p:nvSpPr>
+          <p:cNvPr id="13" name="Text Box 12"/>
+          <p:cNvSpPr txBox="1"/>
+          <p:nvPr/>
+        </p:nvSpPr>
+        <p:spPr>
+          <a:xfrm>
+            <a:off x="1218565" y="984885"/>
+            <a:ext cx="5354320" cy="768350"/>
+          </a:xfrm>
+          <a:prstGeom prst="rect">
+            <a:avLst/>
+          </a:prstGeom>
+          <a:noFill/>
+        </p:spPr>
+        <p:txBody>
+          <a:bodyPr wrap="square" rtlCol="0">
+            <a:spAutoFit/>
+          </a:bodyPr>
+          <a:p>
+            <a:r>
+              <a:rPr lang="en-US" sz="1400"/>
+              <a:t>Example test on synchronous boost converter,</a:t>
+            </a:r>
+            <a:endParaRPr lang="en-US" sz="1400"/>
+          </a:p>
+          <a:p>
+            <a:r>
+              <a:rPr lang="en-US" sz="1000"/>
+              <a:t>normal operation until t = 100m, then turn off the gate signal for upper MOSFET</a:t>
+            </a:r>
+            <a:endParaRPr lang="en-US" sz="1000"/>
+          </a:p>
+          <a:p>
+            <a:r>
+              <a:rPr lang="en-US" sz="1000"/>
+              <a:t>significant increase on the upper MOSFET can be observed due to the massive increase of the conduction loss as current then flows through body diode (where SiC has very high Vf).</a:t>
+            </a:r>
+            <a:endParaRPr lang="en-US" sz="1000"/>
+          </a:p>
+        </p:txBody>
+      </p:sp>
+      <p:pic>
+        <p:nvPicPr>
+          <p:cNvPr id="10" name="Picture 9"/>
+          <p:cNvPicPr>
+            <a:picLocks noChangeAspect="1"/>
+          </p:cNvPicPr>
+          <p:nvPr/>
+        </p:nvPicPr>
+        <p:blipFill>
+          <a:blip r:embed="rId2"/>
+          <a:stretch>
+            <a:fillRect/>
+          </a:stretch>
+        </p:blipFill>
+        <p:spPr>
+          <a:xfrm>
+            <a:off x="1382395" y="1753235"/>
+            <a:ext cx="3921760" cy="4706620"/>
+          </a:xfrm>
+          <a:prstGeom prst="rect">
+            <a:avLst/>
+          </a:prstGeom>
+        </p:spPr>
+      </p:pic>
+      <p:pic>
+        <p:nvPicPr>
+          <p:cNvPr id="11" name="Picture 10"/>
+          <p:cNvPicPr>
+            <a:picLocks noChangeAspect="1"/>
+          </p:cNvPicPr>
+          <p:nvPr/>
+        </p:nvPicPr>
+        <p:blipFill>
+          <a:blip r:embed="rId3"/>
+          <a:stretch>
+            <a:fillRect/>
+          </a:stretch>
+        </p:blipFill>
+        <p:spPr>
+          <a:xfrm>
+            <a:off x="6667500" y="1009650"/>
+            <a:ext cx="4544695" cy="5454015"/>
+          </a:xfrm>
+          <a:prstGeom prst="rect">
+            <a:avLst/>
+          </a:prstGeom>
+        </p:spPr>
+      </p:pic>
+    </p:spTree>
+  </p:cSld>
+  <p:clrMapOvr>
+    <a:masterClrMapping/>
+  </p:clrMapOvr>
+</p:sld>
+</file>
+
+<file path=ppt/slides/slide14.xml><?xml version="1.0" encoding="utf-8"?>
 <p:sld xmlns:a="http://schemas.openxmlformats.org/drawingml/2006/main" xmlns:r="http://schemas.openxmlformats.org/officeDocument/2006/relationships" xmlns:p="http://schemas.openxmlformats.org/presentationml/2006/main">
   <p:cSld>
     <p:spTree>
@@ -6177,6 +6527,12 @@
                       <a:pPr>
                         <a:buNone/>
                       </a:pPr>
+                      <a:r>
+                        <a:rPr lang="en-US" sz="1800">
+                          <a:sym typeface="+mn-ea"/>
+                        </a:rPr>
+                        <a:t>Rev.3 @ 2026/02/12</a:t>
+                      </a:r>
                       <a:endParaRPr lang="en-US"/>
                     </a:p>
                   </a:txBody>
@@ -6189,6 +6545,20 @@
                       <a:pPr>
                         <a:buNone/>
                       </a:pPr>
+                      <a:r>
+                        <a:rPr lang="en-US"/>
+                        <a:t>1. Remove virtual dead-time loss computation. now only allow real body diode losses conduction loss based on real third quadrant current flow with gate OFF.</a:t>
+                      </a:r>
+                      <a:endParaRPr lang="en-US"/>
+                    </a:p>
+                    <a:p>
+                      <a:pPr>
+                        <a:buNone/>
+                      </a:pPr>
+                      <a:r>
+                        <a:rPr lang="en-US"/>
+                        <a:t>2. add new parameter max_prd to force update device loss estimate if the latest loss update time till the present time is greter than max_prd. This is to support the loss estimate in case the MOSFET gate is ON or OFF for prolonged duration.</a:t>
+                      </a:r>
                       <a:endParaRPr lang="en-US"/>
                     </a:p>
                   </a:txBody>
@@ -6514,8 +6884,8 @@
         </p:nvSpPr>
         <p:spPr>
           <a:xfrm>
-            <a:off x="8202295" y="4533265"/>
-            <a:ext cx="3560445" cy="1383665"/>
+            <a:off x="8153400" y="3674745"/>
+            <a:ext cx="3641090" cy="2014220"/>
           </a:xfrm>
           <a:prstGeom prst="rect">
             <a:avLst/>
@@ -6529,9 +6899,14 @@
         </p:spPr>
         <p:txBody>
           <a:bodyPr wrap="square" rtlCol="0">
-            <a:spAutoFit/>
+            <a:noAutofit/>
           </a:bodyPr>
           <a:p>
+            <a:pPr defTabSz="914400">
+              <a:tabLst>
+                <a:tab pos="914400" algn="l"/>
+              </a:tabLst>
+            </a:pPr>
             <a:r>
               <a:rPr lang="en-US" sz="1400"/>
               <a:t>Rgon 	= Turn on gate resistance</a:t>
@@ -6539,6 +6914,11 @@
             <a:endParaRPr lang="en-US" sz="1400"/>
           </a:p>
           <a:p>
+            <a:pPr defTabSz="914400">
+              <a:tabLst>
+                <a:tab pos="914400" algn="l"/>
+              </a:tabLst>
+            </a:pPr>
             <a:r>
               <a:rPr lang="en-US" sz="1400"/>
               <a:t>Rgoff 	= Turn off gate resistance</a:t>
@@ -6546,13 +6926,23 @@
             <a:endParaRPr lang="en-US" sz="1400"/>
           </a:p>
           <a:p>
+            <a:pPr defTabSz="914400">
+              <a:tabLst>
+                <a:tab pos="914400" algn="l"/>
+              </a:tabLst>
+            </a:pPr>
             <a:r>
               <a:rPr lang="en-US" sz="1400"/>
-              <a:t>dtime 	= deadtime duration</a:t>
+              <a:t>max_prd 	= power loss timeout to force 	losses update if the elapsed time 	from latest update time to 	present time reach the max_prd</a:t>
             </a:r>
             <a:endParaRPr lang="en-US" sz="1400"/>
           </a:p>
           <a:p>
+            <a:pPr defTabSz="914400">
+              <a:tabLst>
+                <a:tab pos="914400" algn="l"/>
+              </a:tabLst>
+            </a:pPr>
             <a:r>
               <a:rPr lang="en-US" sz="1400"/>
               <a:t>Npara 	= Number of parallel device</a:t>
@@ -6560,13 +6950,23 @@
             <a:endParaRPr lang="en-US" sz="1400"/>
           </a:p>
           <a:p>
+            <a:pPr defTabSz="914400">
+              <a:tabLst>
+                <a:tab pos="914400" algn="l"/>
+              </a:tabLst>
+            </a:pPr>
             <a:r>
               <a:rPr lang="en-US" sz="1400"/>
-              <a:t>xx_factor 	= losses correction scaling factor</a:t>
+              <a:t>xx_factor	= losses correction scaling factor</a:t>
             </a:r>
             <a:endParaRPr lang="en-US" sz="1400"/>
           </a:p>
           <a:p>
+            <a:pPr defTabSz="914400">
+              <a:tabLst>
+                <a:tab pos="914400" algn="l"/>
+              </a:tabLst>
+            </a:pPr>
             <a:r>
               <a:rPr lang="en-US" sz="1400"/>
               <a:t>fname	= losses table file name</a:t>
@@ -6577,7 +6977,7 @@
       </p:sp>
       <p:pic>
         <p:nvPicPr>
-          <p:cNvPr id="6" name="Picture 5"/>
+          <p:cNvPr id="10" name="Picture 9"/>
           <p:cNvPicPr>
             <a:picLocks noChangeAspect="1"/>
           </p:cNvPicPr>
@@ -6591,8 +6991,8 @@
         </p:blipFill>
         <p:spPr>
           <a:xfrm>
-            <a:off x="8610600" y="1210945"/>
-            <a:ext cx="2648585" cy="2882900"/>
+            <a:off x="8153400" y="1336040"/>
+            <a:ext cx="3641090" cy="1987550"/>
           </a:xfrm>
           <a:prstGeom prst="rect">
             <a:avLst/>

</xml_diff>

<commit_message>
Push PWL LOSS Rev.4 to support mosfet_loss_model in json
</commit_message>
<xml_diff>
--- a/Ideal PWL Transient Losses Analysis/PWL Losses Analysis.pptx
+++ b/Ideal PWL Transient Losses Analysis/PWL Losses Analysis.pptx
@@ -17,11 +17,14 @@
     <p:sldId id="266" r:id="rId10"/>
     <p:sldId id="262" r:id="rId11"/>
     <p:sldId id="263" r:id="rId12"/>
-    <p:sldId id="267" r:id="rId13"/>
-    <p:sldId id="274" r:id="rId14"/>
-    <p:sldId id="273" r:id="rId15"/>
-    <p:sldId id="276" r:id="rId16"/>
-    <p:sldId id="269" r:id="rId17"/>
+    <p:sldId id="276" r:id="rId13"/>
+    <p:sldId id="283" r:id="rId14"/>
+    <p:sldId id="269" r:id="rId15"/>
+    <p:sldId id="278" r:id="rId16"/>
+    <p:sldId id="279" r:id="rId17"/>
+    <p:sldId id="280" r:id="rId18"/>
+    <p:sldId id="281" r:id="rId19"/>
+    <p:sldId id="282" r:id="rId20"/>
   </p:sldIdLst>
   <p:sldSz cx="12192000" cy="6858000"/>
   <p:notesSz cx="6858000" cy="9144000"/>
@@ -695,6 +698,174 @@
 </file>
 
 <file path=ppt/notesSlides/notesSlide13.xml><?xml version="1.0" encoding="utf-8"?>
+<p:notes xmlns:a="http://schemas.openxmlformats.org/drawingml/2006/main" xmlns:r="http://schemas.openxmlformats.org/officeDocument/2006/relationships" xmlns:p="http://schemas.openxmlformats.org/presentationml/2006/main">
+  <p:cSld>
+    <p:spTree>
+      <p:nvGrpSpPr>
+        <p:cNvPr id="1" name=""/>
+        <p:cNvGrpSpPr/>
+        <p:nvPr/>
+      </p:nvGrpSpPr>
+      <p:grpSpPr>
+        <a:xfrm>
+          <a:off x="0" y="0"/>
+          <a:ext cx="0" cy="0"/>
+          <a:chOff x="0" y="0"/>
+          <a:chExt cx="0" cy="0"/>
+        </a:xfrm>
+      </p:grpSpPr>
+      <p:sp>
+        <p:nvSpPr>
+          <p:cNvPr id="2" name="Slide Image Placeholder 1"/>
+          <p:cNvSpPr>
+            <a:spLocks noGrp="1" noRot="1" noChangeAspect="1"/>
+          </p:cNvSpPr>
+          <p:nvPr>
+            <p:ph type="sldImg" idx="2"/>
+          </p:nvPr>
+        </p:nvSpPr>
+        <p:spPr/>
+      </p:sp>
+      <p:sp>
+        <p:nvSpPr>
+          <p:cNvPr id="3" name="Text Placeholder 2"/>
+          <p:cNvSpPr>
+            <a:spLocks noGrp="1"/>
+          </p:cNvSpPr>
+          <p:nvPr>
+            <p:ph type="body" idx="3"/>
+          </p:nvPr>
+        </p:nvSpPr>
+        <p:spPr/>
+        <p:txBody>
+          <a:bodyPr/>
+          <a:lstStyle/>
+          <a:p>
+            <a:endParaRPr lang="en-US"/>
+          </a:p>
+        </p:txBody>
+      </p:sp>
+    </p:spTree>
+  </p:cSld>
+  <p:clrMapOvr>
+    <a:masterClrMapping/>
+  </p:clrMapOvr>
+</p:notes>
+</file>
+
+<file path=ppt/notesSlides/notesSlide14.xml><?xml version="1.0" encoding="utf-8"?>
+<p:notes xmlns:a="http://schemas.openxmlformats.org/drawingml/2006/main" xmlns:r="http://schemas.openxmlformats.org/officeDocument/2006/relationships" xmlns:p="http://schemas.openxmlformats.org/presentationml/2006/main">
+  <p:cSld>
+    <p:spTree>
+      <p:nvGrpSpPr>
+        <p:cNvPr id="1" name=""/>
+        <p:cNvGrpSpPr/>
+        <p:nvPr/>
+      </p:nvGrpSpPr>
+      <p:grpSpPr>
+        <a:xfrm>
+          <a:off x="0" y="0"/>
+          <a:ext cx="0" cy="0"/>
+          <a:chOff x="0" y="0"/>
+          <a:chExt cx="0" cy="0"/>
+        </a:xfrm>
+      </p:grpSpPr>
+      <p:sp>
+        <p:nvSpPr>
+          <p:cNvPr id="2" name="Slide Image Placeholder 1"/>
+          <p:cNvSpPr>
+            <a:spLocks noGrp="1" noRot="1" noChangeAspect="1"/>
+          </p:cNvSpPr>
+          <p:nvPr>
+            <p:ph type="sldImg" idx="2"/>
+          </p:nvPr>
+        </p:nvSpPr>
+        <p:spPr/>
+      </p:sp>
+      <p:sp>
+        <p:nvSpPr>
+          <p:cNvPr id="3" name="Text Placeholder 2"/>
+          <p:cNvSpPr>
+            <a:spLocks noGrp="1"/>
+          </p:cNvSpPr>
+          <p:nvPr>
+            <p:ph type="body" idx="3"/>
+          </p:nvPr>
+        </p:nvSpPr>
+        <p:spPr/>
+        <p:txBody>
+          <a:bodyPr/>
+          <a:lstStyle/>
+          <a:p>
+            <a:endParaRPr lang="en-US"/>
+          </a:p>
+        </p:txBody>
+      </p:sp>
+    </p:spTree>
+  </p:cSld>
+  <p:clrMapOvr>
+    <a:masterClrMapping/>
+  </p:clrMapOvr>
+</p:notes>
+</file>
+
+<file path=ppt/notesSlides/notesSlide15.xml><?xml version="1.0" encoding="utf-8"?>
+<p:notes xmlns:a="http://schemas.openxmlformats.org/drawingml/2006/main" xmlns:r="http://schemas.openxmlformats.org/officeDocument/2006/relationships" xmlns:p="http://schemas.openxmlformats.org/presentationml/2006/main">
+  <p:cSld>
+    <p:spTree>
+      <p:nvGrpSpPr>
+        <p:cNvPr id="1" name=""/>
+        <p:cNvGrpSpPr/>
+        <p:nvPr/>
+      </p:nvGrpSpPr>
+      <p:grpSpPr>
+        <a:xfrm>
+          <a:off x="0" y="0"/>
+          <a:ext cx="0" cy="0"/>
+          <a:chOff x="0" y="0"/>
+          <a:chExt cx="0" cy="0"/>
+        </a:xfrm>
+      </p:grpSpPr>
+      <p:sp>
+        <p:nvSpPr>
+          <p:cNvPr id="2" name="Slide Image Placeholder 1"/>
+          <p:cNvSpPr>
+            <a:spLocks noGrp="1" noRot="1" noChangeAspect="1"/>
+          </p:cNvSpPr>
+          <p:nvPr>
+            <p:ph type="sldImg" idx="2"/>
+          </p:nvPr>
+        </p:nvSpPr>
+        <p:spPr/>
+      </p:sp>
+      <p:sp>
+        <p:nvSpPr>
+          <p:cNvPr id="3" name="Text Placeholder 2"/>
+          <p:cNvSpPr>
+            <a:spLocks noGrp="1"/>
+          </p:cNvSpPr>
+          <p:nvPr>
+            <p:ph type="body" idx="3"/>
+          </p:nvPr>
+        </p:nvSpPr>
+        <p:spPr/>
+        <p:txBody>
+          <a:bodyPr/>
+          <a:lstStyle/>
+          <a:p>
+            <a:endParaRPr lang="en-US"/>
+          </a:p>
+        </p:txBody>
+      </p:sp>
+    </p:spTree>
+  </p:cSld>
+  <p:clrMapOvr>
+    <a:masterClrMapping/>
+  </p:clrMapOvr>
+</p:notes>
+</file>
+
+<file path=ppt/notesSlides/notesSlide16.xml><?xml version="1.0" encoding="utf-8"?>
 <p:notes xmlns:a="http://schemas.openxmlformats.org/drawingml/2006/main" xmlns:r="http://schemas.openxmlformats.org/officeDocument/2006/relationships" xmlns:p="http://schemas.openxmlformats.org/presentationml/2006/main">
   <p:cSld>
     <p:spTree>
@@ -4434,7 +4605,7 @@
                 <a:latin typeface="Arial" panose="020B0604020202020204" pitchFamily="34" charset="0"/>
                 <a:sym typeface="+mn-ea"/>
               </a:rPr>
-              <a:t>PWL SiC MOSFET Transient Losses Analysis in Qspice - Rev. 3</a:t>
+              <a:t>PWL SiC MOSFET Transient Losses Analysis in Qspice - Rev. 4</a:t>
             </a:r>
             <a:endParaRPr lang="en-US" altLang="en-US" sz="4800" b="1" dirty="0">
               <a:solidFill>
@@ -4571,7 +4742,7 @@
           <a:p>
             <a:r>
               <a:rPr lang="en-US" dirty="0"/>
-              <a:t>Simulation test result (for Rev.0)</a:t>
+              <a:t>Simulation test result (for Rev.4)</a:t>
             </a:r>
             <a:endParaRPr lang="en-US" dirty="0"/>
           </a:p>
@@ -4724,9 +4895,52 @@
           </a:prstGeom>
         </p:spPr>
       </p:pic>
+      <p:sp>
+        <p:nvSpPr>
+          <p:cNvPr id="13" name="Text Box 12"/>
+          <p:cNvSpPr txBox="1"/>
+          <p:nvPr/>
+        </p:nvSpPr>
+        <p:spPr>
+          <a:xfrm>
+            <a:off x="1218565" y="984885"/>
+            <a:ext cx="5354320" cy="768350"/>
+          </a:xfrm>
+          <a:prstGeom prst="rect">
+            <a:avLst/>
+          </a:prstGeom>
+          <a:noFill/>
+        </p:spPr>
+        <p:txBody>
+          <a:bodyPr wrap="square" rtlCol="0">
+            <a:spAutoFit/>
+          </a:bodyPr>
+          <a:p>
+            <a:r>
+              <a:rPr lang="en-US" sz="1400"/>
+              <a:t>Example test on synchronous boost converter,</a:t>
+            </a:r>
+            <a:endParaRPr lang="en-US" sz="1400"/>
+          </a:p>
+          <a:p>
+            <a:r>
+              <a:rPr lang="en-US" sz="1000"/>
+              <a:t>normal operation until t = 100m, then turn off the gate signal for upper MOSFET</a:t>
+            </a:r>
+            <a:endParaRPr lang="en-US" sz="1000"/>
+          </a:p>
+          <a:p>
+            <a:r>
+              <a:rPr lang="en-US" sz="1000"/>
+              <a:t>significant increase on the upper MOSFET can be observed due to the massive increase of the conduction loss as current then flows through body diode (where SiC has very high Vf).</a:t>
+            </a:r>
+            <a:endParaRPr lang="en-US" sz="1000"/>
+          </a:p>
+        </p:txBody>
+      </p:sp>
       <p:pic>
         <p:nvPicPr>
-          <p:cNvPr id="16" name="Picture 15"/>
+          <p:cNvPr id="11" name="Picture 10"/>
           <p:cNvPicPr>
             <a:picLocks noChangeAspect="1"/>
           </p:cNvPicPr>
@@ -4740,8 +4954,8 @@
         </p:blipFill>
         <p:spPr>
           <a:xfrm>
-            <a:off x="1007110" y="2261870"/>
-            <a:ext cx="4911090" cy="3977640"/>
+            <a:off x="6667500" y="1009650"/>
+            <a:ext cx="4544695" cy="5454015"/>
           </a:xfrm>
           <a:prstGeom prst="rect">
             <a:avLst/>
@@ -4750,7 +4964,7 @@
       </p:pic>
       <p:pic>
         <p:nvPicPr>
-          <p:cNvPr id="18" name="Picture 17"/>
+          <p:cNvPr id="2" name="Picture 1"/>
           <p:cNvPicPr>
             <a:picLocks noChangeAspect="1"/>
           </p:cNvPicPr>
@@ -4764,43 +4978,14 @@
         </p:blipFill>
         <p:spPr>
           <a:xfrm>
-            <a:off x="6972300" y="1097915"/>
-            <a:ext cx="4381500" cy="5258435"/>
+            <a:off x="1218565" y="1797050"/>
+            <a:ext cx="3825240" cy="4590415"/>
           </a:xfrm>
           <a:prstGeom prst="rect">
             <a:avLst/>
           </a:prstGeom>
         </p:spPr>
       </p:pic>
-      <p:sp>
-        <p:nvSpPr>
-          <p:cNvPr id="2" name="Text Box 1"/>
-          <p:cNvSpPr txBox="1"/>
-          <p:nvPr/>
-        </p:nvSpPr>
-        <p:spPr>
-          <a:xfrm>
-            <a:off x="1007110" y="1140460"/>
-            <a:ext cx="5269230" cy="922020"/>
-          </a:xfrm>
-          <a:prstGeom prst="rect">
-            <a:avLst/>
-          </a:prstGeom>
-          <a:noFill/>
-        </p:spPr>
-        <p:txBody>
-          <a:bodyPr wrap="square" rtlCol="0">
-            <a:spAutoFit/>
-          </a:bodyPr>
-          <a:p>
-            <a:r>
-              <a:rPr lang="en-US"/>
-              <a:t>To use the losses estimation tool, user will need to connect the block to DUT switch and measure all Vgs signal, Vds signal, and drain current as following figure.</a:t>
-            </a:r>
-            <a:endParaRPr lang="en-US"/>
-          </a:p>
-        </p:txBody>
-      </p:sp>
     </p:spTree>
   </p:cSld>
   <p:clrMapOvr>
@@ -4850,7 +5035,7 @@
           <a:p>
             <a:r>
               <a:rPr lang="en-US" dirty="0"/>
-              <a:t>Simulation test result (for Rev.1)</a:t>
+              <a:t>Simulation test result (for Rev.4)</a:t>
             </a:r>
             <a:endParaRPr lang="en-US" dirty="0"/>
           </a:p>
@@ -5003,9 +5188,38 @@
           </a:prstGeom>
         </p:spPr>
       </p:pic>
+      <p:sp>
+        <p:nvSpPr>
+          <p:cNvPr id="13" name="Text Box 12"/>
+          <p:cNvSpPr txBox="1"/>
+          <p:nvPr/>
+        </p:nvSpPr>
+        <p:spPr>
+          <a:xfrm>
+            <a:off x="1218565" y="984885"/>
+            <a:ext cx="5354320" cy="306705"/>
+          </a:xfrm>
+          <a:prstGeom prst="rect">
+            <a:avLst/>
+          </a:prstGeom>
+          <a:noFill/>
+        </p:spPr>
+        <p:txBody>
+          <a:bodyPr wrap="square" rtlCol="0">
+            <a:spAutoFit/>
+          </a:bodyPr>
+          <a:p>
+            <a:r>
+              <a:rPr lang="en-US" sz="1400"/>
+              <a:t>Example test on 3phase inverter</a:t>
+            </a:r>
+            <a:endParaRPr lang="en-US" sz="1000"/>
+          </a:p>
+        </p:txBody>
+      </p:sp>
       <p:pic>
         <p:nvPicPr>
-          <p:cNvPr id="10" name="Picture 9"/>
+          <p:cNvPr id="6" name="Picture 5" descr="Screenshot 2026-02-21 003840"/>
           <p:cNvPicPr>
             <a:picLocks noChangeAspect="1"/>
           </p:cNvPicPr>
@@ -5019,46 +5233,17 @@
         </p:blipFill>
         <p:spPr>
           <a:xfrm>
-            <a:off x="1007110" y="2482215"/>
-            <a:ext cx="5144135" cy="3854450"/>
+            <a:off x="838200" y="1291590"/>
+            <a:ext cx="7219315" cy="4326890"/>
           </a:xfrm>
           <a:prstGeom prst="rect">
             <a:avLst/>
           </a:prstGeom>
         </p:spPr>
       </p:pic>
-      <p:sp>
-        <p:nvSpPr>
-          <p:cNvPr id="6" name="Text Box 5"/>
-          <p:cNvSpPr txBox="1"/>
-          <p:nvPr/>
-        </p:nvSpPr>
-        <p:spPr>
-          <a:xfrm>
-            <a:off x="1007110" y="1140460"/>
-            <a:ext cx="5269230" cy="1322070"/>
-          </a:xfrm>
-          <a:prstGeom prst="rect">
-            <a:avLst/>
-          </a:prstGeom>
-          <a:noFill/>
-        </p:spPr>
-        <p:txBody>
-          <a:bodyPr wrap="square" rtlCol="0">
-            <a:spAutoFit/>
-          </a:bodyPr>
-          <a:p>
-            <a:r>
-              <a:rPr lang="en-US" sz="1600"/>
-              <a:t>User can now directly set the losses analysis at a certain temperature to improve the model accuracy. Furthermore, if you feel need more challenge, you can easily create the thermal circuit model and loop back the Tj estimate into the losses analyzer block.</a:t>
-            </a:r>
-            <a:endParaRPr lang="en-US" sz="1600"/>
-          </a:p>
-        </p:txBody>
-      </p:sp>
       <p:pic>
         <p:nvPicPr>
-          <p:cNvPr id="11" name="Picture 10"/>
+          <p:cNvPr id="14" name="Picture 13" descr="Screenshot 2026-02-21 005028"/>
           <p:cNvPicPr>
             <a:picLocks noChangeAspect="1"/>
           </p:cNvPicPr>
@@ -5072,8 +5257,8 @@
         </p:blipFill>
         <p:spPr>
           <a:xfrm>
-            <a:off x="6769100" y="1033780"/>
-            <a:ext cx="4463415" cy="5356860"/>
+            <a:off x="8337550" y="2253615"/>
+            <a:ext cx="3288665" cy="1972945"/>
           </a:xfrm>
           <a:prstGeom prst="rect">
             <a:avLst/>
@@ -5129,7 +5314,7 @@
           <a:p>
             <a:r>
               <a:rPr lang="en-US" dirty="0"/>
-              <a:t>Simulation test result (for Rev.1)</a:t>
+              <a:t>Conclusion</a:t>
             </a:r>
             <a:endParaRPr lang="en-US" dirty="0"/>
           </a:p>
@@ -5282,41 +5467,16 @@
           </a:prstGeom>
         </p:spPr>
       </p:pic>
-      <p:pic>
-        <p:nvPicPr>
-          <p:cNvPr id="12" name="Picture 11"/>
-          <p:cNvPicPr>
-            <a:picLocks noChangeAspect="1"/>
-          </p:cNvPicPr>
-          <p:nvPr/>
-        </p:nvPicPr>
-        <p:blipFill>
-          <a:blip r:embed="rId2"/>
-          <a:srcRect l="344" t="9835" r="50002" b="10444"/>
-          <a:stretch>
-            <a:fillRect/>
-          </a:stretch>
-        </p:blipFill>
-        <p:spPr>
-          <a:xfrm>
-            <a:off x="1218565" y="1907540"/>
-            <a:ext cx="4686300" cy="4504690"/>
-          </a:xfrm>
-          <a:prstGeom prst="rect">
-            <a:avLst/>
-          </a:prstGeom>
-        </p:spPr>
-      </p:pic>
-      <p:sp>
-        <p:nvSpPr>
-          <p:cNvPr id="13" name="Text Box 12"/>
+      <p:sp>
+        <p:nvSpPr>
+          <p:cNvPr id="6" name="Text Box 5"/>
           <p:cNvSpPr txBox="1"/>
           <p:nvPr/>
         </p:nvSpPr>
         <p:spPr>
           <a:xfrm>
-            <a:off x="1218565" y="984885"/>
-            <a:ext cx="5354320" cy="1229995"/>
+            <a:off x="817245" y="1066800"/>
+            <a:ext cx="10527030" cy="2861310"/>
           </a:xfrm>
           <a:prstGeom prst="rect">
             <a:avLst/>
@@ -5328,62 +5488,247 @@
             <a:spAutoFit/>
           </a:bodyPr>
           <a:p>
-            <a:r>
-              <a:rPr lang="en-US" sz="1400"/>
-              <a:t>Example test on T-type Inverter under</a:t>
-            </a:r>
-            <a:endParaRPr lang="en-US" sz="1400"/>
-          </a:p>
-          <a:p>
-            <a:r>
-              <a:rPr lang="en-US" sz="1000"/>
-              <a:t>AC-&gt;DC power flow (at time &lt; 0.5s) and DC-&gt;AC power flow (at time &gt; 0.5s)</a:t>
-            </a:r>
-            <a:endParaRPr lang="en-US" sz="1000"/>
-          </a:p>
-          <a:p>
-            <a:endParaRPr lang="en-US" sz="1000">
-              <a:sym typeface="+mn-ea"/>
-            </a:endParaRPr>
-          </a:p>
-          <a:p>
-            <a:r>
-              <a:rPr lang="en-US" sz="1000">
-                <a:sym typeface="+mn-ea"/>
-              </a:rPr>
-              <a:t>While total losses on both power flow duration are similar. However, the losses share between the DClink MOSFET (middle graph) and side MOSFET (bottom graph) are different for different power flow mode.</a:t>
-            </a:r>
-            <a:endParaRPr lang="en-US" sz="1000"/>
-          </a:p>
-          <a:p>
-            <a:endParaRPr lang="en-US" sz="1000"/>
-          </a:p>
-        </p:txBody>
-      </p:sp>
-      <p:pic>
-        <p:nvPicPr>
-          <p:cNvPr id="14" name="Picture 13"/>
-          <p:cNvPicPr>
-            <a:picLocks noChangeAspect="1"/>
-          </p:cNvPicPr>
+            <a:pPr marL="305435" indent="-305435">
+              <a:buFont typeface="Arial" panose="020B0604020202020204" pitchFamily="34" charset="0"/>
+              <a:buChar char="•"/>
+            </a:pPr>
+            <a:r>
+              <a:rPr lang="en-US"/>
+              <a:t>An alternative method of transient loss estimation has been developed to be used in Qspice.</a:t>
+            </a:r>
+            <a:endParaRPr lang="en-US"/>
+          </a:p>
+          <a:p>
+            <a:pPr marL="305435" indent="-305435">
+              <a:buFont typeface="Arial" panose="020B0604020202020204" pitchFamily="34" charset="0"/>
+              <a:buChar char="•"/>
+            </a:pPr>
+            <a:r>
+              <a:rPr lang="en-US" altLang="en-US"/>
+              <a:t>The presented method has a number of simplification layers, with the rationale of the approach explained. Note: some reasoning maybe technical, some maybe practical.</a:t>
+            </a:r>
+            <a:endParaRPr lang="en-US" altLang="en-US"/>
+          </a:p>
+          <a:p>
+            <a:pPr marL="305435" indent="-305435">
+              <a:buFont typeface="Arial" panose="020B0604020202020204" pitchFamily="34" charset="0"/>
+              <a:buChar char="•"/>
+            </a:pPr>
+            <a:r>
+              <a:rPr lang="en-US" altLang="en-US"/>
+              <a:t>Simulation result accuracy for the SR-boost test circuit after some comparison with Wolfspeed’s speedfit appears to be quite reasonable (I cant find Infineon’s losses simulator). This result allows me to then use the method to evaluate losses for more complex circuit (e.g. Three phase Active NPC).</a:t>
+            </a:r>
+            <a:endParaRPr lang="en-US" altLang="en-US"/>
+          </a:p>
+          <a:p>
+            <a:pPr marL="305435" indent="-305435">
+              <a:buFont typeface="Arial" panose="020B0604020202020204" pitchFamily="34" charset="0"/>
+              <a:buChar char="•"/>
+            </a:pPr>
+            <a:r>
+              <a:rPr lang="en-US" altLang="en-US"/>
+              <a:t>Overall, this tool I believe is a very powerful tool for every power supply engineer.</a:t>
+            </a:r>
+            <a:endParaRPr lang="en-US" altLang="en-US"/>
+          </a:p>
+          <a:p>
+            <a:pPr marL="305435" indent="-305435">
+              <a:buFont typeface="Arial" panose="020B0604020202020204" pitchFamily="34" charset="0"/>
+              <a:buChar char="•"/>
+            </a:pPr>
+            <a:endParaRPr lang="en-US" altLang="en-US"/>
+          </a:p>
+          <a:p>
+            <a:pPr marL="305435" indent="-305435">
+              <a:buFont typeface="Arial" panose="020B0604020202020204" pitchFamily="34" charset="0"/>
+              <a:buChar char="•"/>
+            </a:pPr>
+            <a:endParaRPr lang="en-US" altLang="en-US"/>
+          </a:p>
+          <a:p>
+            <a:pPr indent="0">
+              <a:buFont typeface="Arial" panose="020B0604020202020204" pitchFamily="34" charset="0"/>
+              <a:buNone/>
+            </a:pPr>
+            <a:r>
+              <a:rPr lang="en-US" altLang="en-US"/>
+              <a:t>Next? for IGBT?</a:t>
+            </a:r>
+            <a:endParaRPr lang="en-US" altLang="en-US"/>
+          </a:p>
+        </p:txBody>
+      </p:sp>
+      <p:sp>
+        <p:nvSpPr>
+          <p:cNvPr id="2" name="Text Box 1"/>
+          <p:cNvSpPr txBox="1"/>
           <p:nvPr/>
-        </p:nvPicPr>
-        <p:blipFill>
-          <a:blip r:embed="rId3"/>
-          <a:stretch>
-            <a:fillRect/>
-          </a:stretch>
-        </p:blipFill>
-        <p:spPr>
-          <a:xfrm>
-            <a:off x="6830695" y="984885"/>
-            <a:ext cx="4523105" cy="5427345"/>
+        </p:nvSpPr>
+        <p:spPr>
+          <a:xfrm>
+            <a:off x="817245" y="4824095"/>
+            <a:ext cx="10535920" cy="1198880"/>
           </a:xfrm>
           <a:prstGeom prst="rect">
             <a:avLst/>
           </a:prstGeom>
-        </p:spPr>
-      </p:pic>
+          <a:noFill/>
+        </p:spPr>
+        <p:txBody>
+          <a:bodyPr wrap="square" rtlCol="0" anchor="t">
+            <a:spAutoFit/>
+          </a:bodyPr>
+          <a:p>
+            <a:pPr marL="305435" indent="-305435"/>
+            <a:r>
+              <a:rPr lang="en-US">
+                <a:sym typeface="+mn-ea"/>
+              </a:rPr>
+              <a:t>[1] Infineon </a:t>
+            </a:r>
+            <a:r>
+              <a:rPr lang="en-US" altLang="en-US">
+                <a:sym typeface="+mn-ea"/>
+              </a:rPr>
+              <a:t>IMZA75R040M1H - Datasheet</a:t>
+            </a:r>
+            <a:endParaRPr lang="en-US" altLang="en-US"/>
+          </a:p>
+          <a:p>
+            <a:pPr marL="305435" indent="-305435"/>
+            <a:r>
+              <a:rPr lang="en-US" altLang="en-US">
+                <a:sym typeface="+mn-ea"/>
+              </a:rPr>
+              <a:t>[2] Infineon IMW120R040M1H - Datasheet</a:t>
+            </a:r>
+            <a:endParaRPr lang="en-US" altLang="en-US"/>
+          </a:p>
+          <a:p>
+            <a:pPr marL="305435" indent="-305435"/>
+            <a:r>
+              <a:rPr lang="en-US" altLang="en-US">
+                <a:sym typeface="+mn-ea"/>
+              </a:rPr>
+              <a:t>[3] Estimating SiC MOSFET switching losses in applications https://community.infineon.com/t5/Knowledge-Base-Articles/Estimating-SiC-MOSFET-switching-losses-in-applications/ta-p/709113</a:t>
+            </a:r>
+            <a:endParaRPr lang="en-US" altLang="en-US">
+              <a:sym typeface="+mn-ea"/>
+            </a:endParaRPr>
+          </a:p>
+        </p:txBody>
+      </p:sp>
+      <p:sp>
+        <p:nvSpPr>
+          <p:cNvPr id="10" name="Title 4"/>
+          <p:cNvSpPr>
+            <a:spLocks noGrp="1"/>
+          </p:cNvSpPr>
+          <p:nvPr/>
+        </p:nvSpPr>
+        <p:spPr>
+          <a:xfrm>
+            <a:off x="828675" y="4232275"/>
+            <a:ext cx="10515600" cy="619613"/>
+          </a:xfrm>
+          <a:prstGeom prst="rect">
+            <a:avLst/>
+          </a:prstGeom>
+        </p:spPr>
+        <p:txBody>
+          <a:bodyPr vert="horz" lIns="91440" tIns="45720" rIns="91440" bIns="45720" rtlCol="0" anchor="ctr">
+            <a:normAutofit fontScale="70000"/>
+          </a:bodyPr>
+          <a:lstStyle>
+            <a:lvl1pPr algn="l" defTabSz="914400" rtl="0" eaLnBrk="1" latinLnBrk="0" hangingPunct="1">
+              <a:lnSpc>
+                <a:spcPct val="90000"/>
+              </a:lnSpc>
+              <a:spcBef>
+                <a:spcPct val="0"/>
+              </a:spcBef>
+              <a:buNone/>
+              <a:defRPr sz="4400" kern="1200">
+                <a:solidFill>
+                  <a:schemeClr val="tx1"/>
+                </a:solidFill>
+                <a:latin typeface="+mj-lt"/>
+                <a:ea typeface="+mj-ea"/>
+                <a:cs typeface="+mj-cs"/>
+              </a:defRPr>
+            </a:lvl1pPr>
+          </a:lstStyle>
+          <a:p>
+            <a:r>
+              <a:rPr lang="en-US" dirty="0"/>
+              <a:t>References</a:t>
+            </a:r>
+            <a:endParaRPr lang="en-US" dirty="0"/>
+          </a:p>
+        </p:txBody>
+      </p:sp>
+      <p:cxnSp>
+        <p:nvCxnSpPr>
+          <p:cNvPr id="11" name="Straight Connector 10"/>
+          <p:cNvCxnSpPr/>
+          <p:nvPr/>
+        </p:nvCxnSpPr>
+        <p:spPr>
+          <a:xfrm>
+            <a:off x="816949" y="4807928"/>
+            <a:ext cx="10527326" cy="0"/>
+          </a:xfrm>
+          <a:prstGeom prst="line">
+            <a:avLst/>
+          </a:prstGeom>
+          <a:ln w="28575"/>
+        </p:spPr>
+        <p:style>
+          <a:lnRef idx="1">
+            <a:schemeClr val="accent1"/>
+          </a:lnRef>
+          <a:fillRef idx="0">
+            <a:schemeClr val="accent1"/>
+          </a:fillRef>
+          <a:effectRef idx="0">
+            <a:schemeClr val="accent1"/>
+          </a:effectRef>
+          <a:fontRef idx="minor">
+            <a:schemeClr val="tx1"/>
+          </a:fontRef>
+        </p:style>
+      </p:cxnSp>
+      <p:cxnSp>
+        <p:nvCxnSpPr>
+          <p:cNvPr id="12" name="Straight Connector 11"/>
+          <p:cNvCxnSpPr/>
+          <p:nvPr/>
+        </p:nvCxnSpPr>
+        <p:spPr>
+          <a:xfrm>
+            <a:off x="816949" y="4235207"/>
+            <a:ext cx="10527326" cy="0"/>
+          </a:xfrm>
+          <a:prstGeom prst="line">
+            <a:avLst/>
+          </a:prstGeom>
+          <a:ln w="28575"/>
+        </p:spPr>
+        <p:style>
+          <a:lnRef idx="1">
+            <a:schemeClr val="accent1"/>
+          </a:lnRef>
+          <a:fillRef idx="0">
+            <a:schemeClr val="accent1"/>
+          </a:fillRef>
+          <a:effectRef idx="0">
+            <a:schemeClr val="accent1"/>
+          </a:effectRef>
+          <a:fontRef idx="minor">
+            <a:schemeClr val="tx1"/>
+          </a:fontRef>
+        </p:style>
+      </p:cxnSp>
     </p:spTree>
   </p:cSld>
   <p:clrMapOvr>
@@ -5433,7 +5778,7 @@
           <a:p>
             <a:r>
               <a:rPr lang="en-US" dirty="0"/>
-              <a:t>Simulation test result (for Rev.3)</a:t>
+              <a:t>No longer used slide</a:t>
             </a:r>
             <a:endParaRPr lang="en-US" dirty="0"/>
           </a:p>
@@ -5588,95 +5933,50 @@
       </p:pic>
       <p:sp>
         <p:nvSpPr>
-          <p:cNvPr id="13" name="Text Box 12"/>
-          <p:cNvSpPr txBox="1"/>
+          <p:cNvPr id="10" name="&quot;No&quot; Symbol 9"/>
+          <p:cNvSpPr/>
           <p:nvPr/>
         </p:nvSpPr>
         <p:spPr>
           <a:xfrm>
-            <a:off x="1218565" y="984885"/>
-            <a:ext cx="5354320" cy="768350"/>
-          </a:xfrm>
-          <a:prstGeom prst="rect">
+            <a:off x="3510915" y="1186180"/>
+            <a:ext cx="5170170" cy="5170170"/>
+          </a:xfrm>
+          <a:prstGeom prst="noSmoking">
             <a:avLst/>
           </a:prstGeom>
-          <a:noFill/>
-        </p:spPr>
-        <p:txBody>
-          <a:bodyPr wrap="square" rtlCol="0">
-            <a:spAutoFit/>
-          </a:bodyPr>
-          <a:p>
-            <a:r>
-              <a:rPr lang="en-US" sz="1400"/>
-              <a:t>Example test on synchronous boost converter,</a:t>
-            </a:r>
-            <a:endParaRPr lang="en-US" sz="1400"/>
-          </a:p>
-          <a:p>
-            <a:r>
-              <a:rPr lang="en-US" sz="1000"/>
-              <a:t>normal operation until t = 100m, then turn off the gate signal for upper MOSFET</a:t>
-            </a:r>
-            <a:endParaRPr lang="en-US" sz="1000"/>
-          </a:p>
-          <a:p>
-            <a:r>
-              <a:rPr lang="en-US" sz="1000"/>
-              <a:t>significant increase on the upper MOSFET can be observed due to the massive increase of the conduction loss as current then flows through body diode (where SiC has very high Vf).</a:t>
-            </a:r>
-            <a:endParaRPr lang="en-US" sz="1000"/>
-          </a:p>
-        </p:txBody>
-      </p:sp>
-      <p:pic>
-        <p:nvPicPr>
-          <p:cNvPr id="10" name="Picture 9"/>
-          <p:cNvPicPr>
-            <a:picLocks noChangeAspect="1"/>
-          </p:cNvPicPr>
-          <p:nvPr/>
-        </p:nvPicPr>
-        <p:blipFill>
-          <a:blip r:embed="rId2"/>
-          <a:stretch>
-            <a:fillRect/>
-          </a:stretch>
-        </p:blipFill>
-        <p:spPr>
-          <a:xfrm>
-            <a:off x="1382395" y="1753235"/>
-            <a:ext cx="3921760" cy="4706620"/>
-          </a:xfrm>
-          <a:prstGeom prst="rect">
-            <a:avLst/>
-          </a:prstGeom>
-        </p:spPr>
-      </p:pic>
-      <p:pic>
-        <p:nvPicPr>
-          <p:cNvPr id="11" name="Picture 10"/>
-          <p:cNvPicPr>
-            <a:picLocks noChangeAspect="1"/>
-          </p:cNvPicPr>
-          <p:nvPr/>
-        </p:nvPicPr>
-        <p:blipFill>
-          <a:blip r:embed="rId3"/>
-          <a:stretch>
-            <a:fillRect/>
-          </a:stretch>
-        </p:blipFill>
-        <p:spPr>
-          <a:xfrm>
-            <a:off x="6667500" y="1009650"/>
-            <a:ext cx="4544695" cy="5454015"/>
-          </a:xfrm>
-          <a:prstGeom prst="rect">
-            <a:avLst/>
-          </a:prstGeom>
-        </p:spPr>
-      </p:pic>
+          <a:solidFill>
+            <a:srgbClr val="FF0000"/>
+          </a:solidFill>
+        </p:spPr>
+        <p:style>
+          <a:lnRef idx="2">
+            <a:schemeClr val="accent1">
+              <a:lumMod val="75000"/>
+            </a:schemeClr>
+          </a:lnRef>
+          <a:fillRef idx="1">
+            <a:schemeClr val="accent1"/>
+          </a:fillRef>
+          <a:effectRef idx="0">
+            <a:srgbClr val="FFFFFF"/>
+          </a:effectRef>
+          <a:fontRef idx="minor">
+            <a:schemeClr val="lt1"/>
+          </a:fontRef>
+        </p:style>
+        <p:txBody>
+          <a:bodyPr rtlCol="0" anchor="ctr"/>
+          <a:p>
+            <a:pPr algn="ctr"/>
+            <a:endParaRPr lang="en-US">
+              <a:solidFill>
+                <a:schemeClr val="tx1"/>
+              </a:solidFill>
+            </a:endParaRPr>
+          </a:p>
+        </p:txBody>
+      </p:sp>
     </p:spTree>
   </p:cSld>
   <p:clrMapOvr>
@@ -5726,7 +6026,7 @@
           <a:p>
             <a:r>
               <a:rPr lang="en-US" dirty="0"/>
-              <a:t>Conclusion</a:t>
+              <a:t>Understanding the losses table format</a:t>
             </a:r>
             <a:endParaRPr lang="en-US" dirty="0"/>
           </a:p>
@@ -5879,16 +6179,816 @@
           </a:prstGeom>
         </p:spPr>
       </p:pic>
-      <p:sp>
-        <p:nvSpPr>
-          <p:cNvPr id="6" name="Text Box 5"/>
+      <p:graphicFrame>
+        <p:nvGraphicFramePr>
+          <p:cNvPr id="13" name="Table 12"/>
+          <p:cNvGraphicFramePr/>
+          <p:nvPr/>
+        </p:nvGraphicFramePr>
+        <p:xfrm>
+          <a:off x="880745" y="1157605"/>
+          <a:ext cx="8530590" cy="1920240"/>
+        </p:xfrm>
+        <a:graphic>
+          <a:graphicData uri="http://schemas.openxmlformats.org/drawingml/2006/table">
+            <a:tbl>
+              <a:tblPr>
+                <a:tableStyleId>{5C22544A-7EE6-4342-B048-85BDC9FD1C3A}</a:tableStyleId>
+              </a:tblPr>
+              <a:tblGrid>
+                <a:gridCol w="1188720"/>
+                <a:gridCol w="1188720"/>
+                <a:gridCol w="1188720"/>
+                <a:gridCol w="1188720"/>
+                <a:gridCol w="1188720"/>
+                <a:gridCol w="1188720"/>
+              </a:tblGrid>
+              <a:tr h="274320">
+                <a:tc>
+                  <a:txBody>
+                    <a:bodyPr/>
+                    <a:p>
+                      <a:pPr>
+                        <a:buNone/>
+                      </a:pPr>
+                      <a:r>
+                        <a:rPr lang="en-US" sz="1200">
+                          <a:latin typeface="Calibri" panose="020F0502020204030204" charset="0"/>
+                          <a:cs typeface="Calibri" panose="020F0502020204030204" charset="0"/>
+                        </a:rPr>
+                        <a:t>Rdson</a:t>
+                      </a:r>
+                      <a:endParaRPr lang="en-US" sz="1200">
+                        <a:latin typeface="Calibri" panose="020F0502020204030204" charset="0"/>
+                        <a:cs typeface="Calibri" panose="020F0502020204030204" charset="0"/>
+                      </a:endParaRPr>
+                    </a:p>
+                  </a:txBody>
+                  <a:tcPr/>
+                </a:tc>
+                <a:tc>
+                  <a:txBody>
+                    <a:bodyPr/>
+                    <a:p>
+                      <a:pPr>
+                        <a:buNone/>
+                      </a:pPr>
+                      <a:r>
+                        <a:rPr lang="en-US" sz="1200">
+                          <a:latin typeface="Calibri" panose="020F0502020204030204" charset="0"/>
+                          <a:cs typeface="Calibri" panose="020F0502020204030204" charset="0"/>
+                        </a:rPr>
+                        <a:t>Ton</a:t>
+                      </a:r>
+                      <a:endParaRPr lang="en-US" sz="1200">
+                        <a:latin typeface="Calibri" panose="020F0502020204030204" charset="0"/>
+                        <a:cs typeface="Calibri" panose="020F0502020204030204" charset="0"/>
+                      </a:endParaRPr>
+                    </a:p>
+                  </a:txBody>
+                  <a:tcPr/>
+                </a:tc>
+                <a:tc>
+                  <a:txBody>
+                    <a:bodyPr/>
+                    <a:p>
+                      <a:pPr>
+                        <a:buNone/>
+                      </a:pPr>
+                      <a:r>
+                        <a:rPr lang="en-US" sz="1200">
+                          <a:latin typeface="Calibri" panose="020F0502020204030204" charset="0"/>
+                          <a:cs typeface="Calibri" panose="020F0502020204030204" charset="0"/>
+                        </a:rPr>
+                        <a:t>Toff</a:t>
+                      </a:r>
+                      <a:endParaRPr lang="en-US" sz="1200">
+                        <a:latin typeface="Calibri" panose="020F0502020204030204" charset="0"/>
+                        <a:cs typeface="Calibri" panose="020F0502020204030204" charset="0"/>
+                      </a:endParaRPr>
+                    </a:p>
+                  </a:txBody>
+                  <a:tcPr/>
+                </a:tc>
+                <a:tc>
+                  <a:txBody>
+                    <a:bodyPr/>
+                    <a:p>
+                      <a:pPr>
+                        <a:buNone/>
+                      </a:pPr>
+                      <a:r>
+                        <a:rPr lang="en-US" sz="1200">
+                          <a:latin typeface="Calibri" panose="020F0502020204030204" charset="0"/>
+                          <a:cs typeface="Calibri" panose="020F0502020204030204" charset="0"/>
+                        </a:rPr>
+                        <a:t>Rg_test</a:t>
+                      </a:r>
+                      <a:endParaRPr lang="en-US" sz="1200">
+                        <a:latin typeface="Calibri" panose="020F0502020204030204" charset="0"/>
+                        <a:cs typeface="Calibri" panose="020F0502020204030204" charset="0"/>
+                      </a:endParaRPr>
+                    </a:p>
+                  </a:txBody>
+                  <a:tcPr/>
+                </a:tc>
+                <a:tc>
+                  <a:txBody>
+                    <a:bodyPr/>
+                    <a:p>
+                      <a:pPr>
+                        <a:buNone/>
+                      </a:pPr>
+                      <a:r>
+                        <a:rPr lang="en-US" sz="1200">
+                          <a:latin typeface="Calibri" panose="020F0502020204030204" charset="0"/>
+                          <a:cs typeface="Calibri" panose="020F0502020204030204" charset="0"/>
+                        </a:rPr>
+                        <a:t>Rg_int</a:t>
+                      </a:r>
+                      <a:endParaRPr lang="en-US" sz="1200">
+                        <a:latin typeface="Calibri" panose="020F0502020204030204" charset="0"/>
+                        <a:cs typeface="Calibri" panose="020F0502020204030204" charset="0"/>
+                      </a:endParaRPr>
+                    </a:p>
+                  </a:txBody>
+                  <a:tcPr/>
+                </a:tc>
+                <a:tc>
+                  <a:txBody>
+                    <a:bodyPr/>
+                    <a:p>
+                      <a:pPr>
+                        <a:buNone/>
+                      </a:pPr>
+                      <a:r>
+                        <a:rPr lang="en-US" sz="1200">
+                          <a:latin typeface="Calibri" panose="020F0502020204030204" charset="0"/>
+                          <a:cs typeface="Calibri" panose="020F0502020204030204" charset="0"/>
+                        </a:rPr>
+                        <a:t>0.0</a:t>
+                      </a:r>
+                      <a:endParaRPr lang="en-US" sz="1200">
+                        <a:latin typeface="Calibri" panose="020F0502020204030204" charset="0"/>
+                        <a:cs typeface="Calibri" panose="020F0502020204030204" charset="0"/>
+                      </a:endParaRPr>
+                    </a:p>
+                  </a:txBody>
+                  <a:tcPr/>
+                </a:tc>
+              </a:tr>
+              <a:tr h="274320">
+                <a:tc>
+                  <a:txBody>
+                    <a:bodyPr/>
+                    <a:p>
+                      <a:pPr>
+                        <a:buNone/>
+                      </a:pPr>
+                      <a:r>
+                        <a:rPr lang="en-US" sz="1200">
+                          <a:latin typeface="Calibri" panose="020F0502020204030204" charset="0"/>
+                          <a:cs typeface="Calibri" panose="020F0502020204030204" charset="0"/>
+                        </a:rPr>
+                        <a:t>Vds (0V)</a:t>
+                      </a:r>
+                      <a:endParaRPr lang="en-US" sz="1200">
+                        <a:latin typeface="Calibri" panose="020F0502020204030204" charset="0"/>
+                        <a:cs typeface="Calibri" panose="020F0502020204030204" charset="0"/>
+                      </a:endParaRPr>
+                    </a:p>
+                  </a:txBody>
+                  <a:tcPr/>
+                </a:tc>
+                <a:tc>
+                  <a:txBody>
+                    <a:bodyPr/>
+                    <a:p>
+                      <a:pPr>
+                        <a:buNone/>
+                      </a:pPr>
+                      <a:endParaRPr lang="en-US" sz="1200">
+                        <a:latin typeface="Calibri" panose="020F0502020204030204" charset="0"/>
+                        <a:cs typeface="Calibri" panose="020F0502020204030204" charset="0"/>
+                      </a:endParaRPr>
+                    </a:p>
+                  </a:txBody>
+                  <a:tcPr/>
+                </a:tc>
+                <a:tc>
+                  <a:txBody>
+                    <a:bodyPr/>
+                    <a:p>
+                      <a:pPr>
+                        <a:buNone/>
+                      </a:pPr>
+                      <a:endParaRPr lang="en-US" sz="1200">
+                        <a:latin typeface="Calibri" panose="020F0502020204030204" charset="0"/>
+                        <a:cs typeface="Calibri" panose="020F0502020204030204" charset="0"/>
+                      </a:endParaRPr>
+                    </a:p>
+                  </a:txBody>
+                  <a:tcPr/>
+                </a:tc>
+                <a:tc>
+                  <a:txBody>
+                    <a:bodyPr/>
+                    <a:p>
+                      <a:pPr>
+                        <a:buNone/>
+                      </a:pPr>
+                      <a:endParaRPr lang="en-US" sz="1200">
+                        <a:latin typeface="Calibri" panose="020F0502020204030204" charset="0"/>
+                        <a:cs typeface="Calibri" panose="020F0502020204030204" charset="0"/>
+                      </a:endParaRPr>
+                    </a:p>
+                  </a:txBody>
+                  <a:tcPr/>
+                </a:tc>
+                <a:tc>
+                  <a:txBody>
+                    <a:bodyPr/>
+                    <a:p>
+                      <a:pPr>
+                        <a:buNone/>
+                      </a:pPr>
+                      <a:endParaRPr lang="en-US" sz="1200">
+                        <a:latin typeface="Calibri" panose="020F0502020204030204" charset="0"/>
+                        <a:cs typeface="Calibri" panose="020F0502020204030204" charset="0"/>
+                      </a:endParaRPr>
+                    </a:p>
+                  </a:txBody>
+                  <a:tcPr/>
+                </a:tc>
+                <a:tc>
+                  <a:txBody>
+                    <a:bodyPr/>
+                    <a:p>
+                      <a:pPr>
+                        <a:buNone/>
+                      </a:pPr>
+                      <a:r>
+                        <a:rPr lang="en-US" sz="1200">
+                          <a:latin typeface="Calibri" panose="020F0502020204030204" charset="0"/>
+                          <a:cs typeface="Calibri" panose="020F0502020204030204" charset="0"/>
+                        </a:rPr>
+                        <a:t>Vds (Vrating)</a:t>
+                      </a:r>
+                      <a:endParaRPr lang="en-US" sz="1200">
+                        <a:latin typeface="Calibri" panose="020F0502020204030204" charset="0"/>
+                        <a:cs typeface="Calibri" panose="020F0502020204030204" charset="0"/>
+                      </a:endParaRPr>
+                    </a:p>
+                  </a:txBody>
+                  <a:tcPr/>
+                </a:tc>
+              </a:tr>
+              <a:tr h="274320">
+                <a:tc>
+                  <a:txBody>
+                    <a:bodyPr/>
+                    <a:p>
+                      <a:pPr>
+                        <a:buNone/>
+                      </a:pPr>
+                      <a:r>
+                        <a:rPr lang="en-US" sz="1200">
+                          <a:latin typeface="Calibri" panose="020F0502020204030204" charset="0"/>
+                          <a:cs typeface="Calibri" panose="020F0502020204030204" charset="0"/>
+                        </a:rPr>
+                        <a:t>Coss(@Vds)</a:t>
+                      </a:r>
+                      <a:endParaRPr lang="en-US" sz="1200">
+                        <a:latin typeface="Calibri" panose="020F0502020204030204" charset="0"/>
+                        <a:cs typeface="Calibri" panose="020F0502020204030204" charset="0"/>
+                      </a:endParaRPr>
+                    </a:p>
+                  </a:txBody>
+                  <a:tcPr/>
+                </a:tc>
+                <a:tc>
+                  <a:txBody>
+                    <a:bodyPr/>
+                    <a:p>
+                      <a:pPr>
+                        <a:buNone/>
+                      </a:pPr>
+                      <a:endParaRPr lang="en-US" sz="1200">
+                        <a:latin typeface="Calibri" panose="020F0502020204030204" charset="0"/>
+                        <a:cs typeface="Calibri" panose="020F0502020204030204" charset="0"/>
+                      </a:endParaRPr>
+                    </a:p>
+                  </a:txBody>
+                  <a:tcPr/>
+                </a:tc>
+                <a:tc>
+                  <a:txBody>
+                    <a:bodyPr/>
+                    <a:p>
+                      <a:pPr>
+                        <a:buNone/>
+                      </a:pPr>
+                      <a:endParaRPr lang="en-US" sz="1200">
+                        <a:latin typeface="Calibri" panose="020F0502020204030204" charset="0"/>
+                        <a:cs typeface="Calibri" panose="020F0502020204030204" charset="0"/>
+                      </a:endParaRPr>
+                    </a:p>
+                  </a:txBody>
+                  <a:tcPr/>
+                </a:tc>
+                <a:tc>
+                  <a:txBody>
+                    <a:bodyPr/>
+                    <a:p>
+                      <a:pPr>
+                        <a:buNone/>
+                      </a:pPr>
+                      <a:endParaRPr lang="en-US" sz="1200">
+                        <a:latin typeface="Calibri" panose="020F0502020204030204" charset="0"/>
+                        <a:cs typeface="Calibri" panose="020F0502020204030204" charset="0"/>
+                      </a:endParaRPr>
+                    </a:p>
+                  </a:txBody>
+                  <a:tcPr/>
+                </a:tc>
+                <a:tc>
+                  <a:txBody>
+                    <a:bodyPr/>
+                    <a:p>
+                      <a:pPr>
+                        <a:buNone/>
+                      </a:pPr>
+                      <a:endParaRPr lang="en-US" sz="1200">
+                        <a:latin typeface="Calibri" panose="020F0502020204030204" charset="0"/>
+                        <a:cs typeface="Calibri" panose="020F0502020204030204" charset="0"/>
+                      </a:endParaRPr>
+                    </a:p>
+                  </a:txBody>
+                  <a:tcPr/>
+                </a:tc>
+                <a:tc>
+                  <a:txBody>
+                    <a:bodyPr/>
+                    <a:p>
+                      <a:pPr>
+                        <a:buNone/>
+                      </a:pPr>
+                      <a:r>
+                        <a:rPr lang="en-US" sz="1200">
+                          <a:latin typeface="Calibri" panose="020F0502020204030204" charset="0"/>
+                          <a:cs typeface="Calibri" panose="020F0502020204030204" charset="0"/>
+                        </a:rPr>
+                        <a:t>Coss(@Vds)</a:t>
+                      </a:r>
+                      <a:endParaRPr lang="en-US" sz="1200">
+                        <a:latin typeface="Calibri" panose="020F0502020204030204" charset="0"/>
+                        <a:cs typeface="Calibri" panose="020F0502020204030204" charset="0"/>
+                      </a:endParaRPr>
+                    </a:p>
+                  </a:txBody>
+                  <a:tcPr/>
+                </a:tc>
+              </a:tr>
+              <a:tr h="274320">
+                <a:tc>
+                  <a:txBody>
+                    <a:bodyPr/>
+                    <a:p>
+                      <a:pPr>
+                        <a:buNone/>
+                      </a:pPr>
+                      <a:r>
+                        <a:rPr lang="en-US" sz="1200">
+                          <a:latin typeface="Calibri" panose="020F0502020204030204" charset="0"/>
+                          <a:cs typeface="Calibri" panose="020F0502020204030204" charset="0"/>
+                        </a:rPr>
+                        <a:t>Isd (0A)</a:t>
+                      </a:r>
+                      <a:endParaRPr lang="en-US" sz="1200">
+                        <a:latin typeface="Calibri" panose="020F0502020204030204" charset="0"/>
+                        <a:cs typeface="Calibri" panose="020F0502020204030204" charset="0"/>
+                      </a:endParaRPr>
+                    </a:p>
+                  </a:txBody>
+                  <a:tcPr/>
+                </a:tc>
+                <a:tc>
+                  <a:txBody>
+                    <a:bodyPr/>
+                    <a:p>
+                      <a:pPr>
+                        <a:buNone/>
+                      </a:pPr>
+                      <a:endParaRPr lang="en-US" sz="1200">
+                        <a:latin typeface="Calibri" panose="020F0502020204030204" charset="0"/>
+                        <a:cs typeface="Calibri" panose="020F0502020204030204" charset="0"/>
+                      </a:endParaRPr>
+                    </a:p>
+                  </a:txBody>
+                  <a:tcPr/>
+                </a:tc>
+                <a:tc>
+                  <a:txBody>
+                    <a:bodyPr/>
+                    <a:p>
+                      <a:pPr>
+                        <a:buNone/>
+                      </a:pPr>
+                      <a:endParaRPr lang="en-US" sz="1200">
+                        <a:latin typeface="Calibri" panose="020F0502020204030204" charset="0"/>
+                        <a:cs typeface="Calibri" panose="020F0502020204030204" charset="0"/>
+                      </a:endParaRPr>
+                    </a:p>
+                  </a:txBody>
+                  <a:tcPr/>
+                </a:tc>
+                <a:tc>
+                  <a:txBody>
+                    <a:bodyPr/>
+                    <a:p>
+                      <a:pPr>
+                        <a:buNone/>
+                      </a:pPr>
+                      <a:endParaRPr lang="en-US" sz="1200">
+                        <a:latin typeface="Calibri" panose="020F0502020204030204" charset="0"/>
+                        <a:cs typeface="Calibri" panose="020F0502020204030204" charset="0"/>
+                      </a:endParaRPr>
+                    </a:p>
+                  </a:txBody>
+                  <a:tcPr/>
+                </a:tc>
+                <a:tc>
+                  <a:txBody>
+                    <a:bodyPr/>
+                    <a:p>
+                      <a:pPr>
+                        <a:buNone/>
+                      </a:pPr>
+                      <a:endParaRPr lang="en-US" sz="1200">
+                        <a:latin typeface="Calibri" panose="020F0502020204030204" charset="0"/>
+                        <a:cs typeface="Calibri" panose="020F0502020204030204" charset="0"/>
+                      </a:endParaRPr>
+                    </a:p>
+                  </a:txBody>
+                  <a:tcPr/>
+                </a:tc>
+                <a:tc>
+                  <a:txBody>
+                    <a:bodyPr/>
+                    <a:p>
+                      <a:pPr>
+                        <a:buNone/>
+                      </a:pPr>
+                      <a:r>
+                        <a:rPr lang="en-US" sz="1200">
+                          <a:latin typeface="Calibri" panose="020F0502020204030204" charset="0"/>
+                          <a:cs typeface="Calibri" panose="020F0502020204030204" charset="0"/>
+                        </a:rPr>
+                        <a:t>Isd (Irating)</a:t>
+                      </a:r>
+                      <a:endParaRPr lang="en-US" sz="1200">
+                        <a:latin typeface="Calibri" panose="020F0502020204030204" charset="0"/>
+                        <a:cs typeface="Calibri" panose="020F0502020204030204" charset="0"/>
+                      </a:endParaRPr>
+                    </a:p>
+                  </a:txBody>
+                  <a:tcPr/>
+                </a:tc>
+              </a:tr>
+              <a:tr h="274320">
+                <a:tc>
+                  <a:txBody>
+                    <a:bodyPr/>
+                    <a:p>
+                      <a:pPr>
+                        <a:buNone/>
+                      </a:pPr>
+                      <a:r>
+                        <a:rPr lang="en-US" sz="1200">
+                          <a:latin typeface="Calibri" panose="020F0502020204030204" charset="0"/>
+                          <a:cs typeface="Calibri" panose="020F0502020204030204" charset="0"/>
+                        </a:rPr>
+                        <a:t>Vsd(@Isd)</a:t>
+                      </a:r>
+                      <a:endParaRPr lang="en-US" sz="1200">
+                        <a:latin typeface="Calibri" panose="020F0502020204030204" charset="0"/>
+                        <a:cs typeface="Calibri" panose="020F0502020204030204" charset="0"/>
+                      </a:endParaRPr>
+                    </a:p>
+                  </a:txBody>
+                  <a:tcPr/>
+                </a:tc>
+                <a:tc>
+                  <a:txBody>
+                    <a:bodyPr/>
+                    <a:p>
+                      <a:pPr>
+                        <a:buNone/>
+                      </a:pPr>
+                      <a:endParaRPr lang="en-US" sz="1200">
+                        <a:latin typeface="Calibri" panose="020F0502020204030204" charset="0"/>
+                        <a:cs typeface="Calibri" panose="020F0502020204030204" charset="0"/>
+                      </a:endParaRPr>
+                    </a:p>
+                  </a:txBody>
+                  <a:tcPr/>
+                </a:tc>
+                <a:tc>
+                  <a:txBody>
+                    <a:bodyPr/>
+                    <a:p>
+                      <a:pPr>
+                        <a:buNone/>
+                      </a:pPr>
+                      <a:endParaRPr lang="en-US" sz="1200">
+                        <a:latin typeface="Calibri" panose="020F0502020204030204" charset="0"/>
+                        <a:cs typeface="Calibri" panose="020F0502020204030204" charset="0"/>
+                      </a:endParaRPr>
+                    </a:p>
+                  </a:txBody>
+                  <a:tcPr/>
+                </a:tc>
+                <a:tc>
+                  <a:txBody>
+                    <a:bodyPr/>
+                    <a:p>
+                      <a:pPr>
+                        <a:buNone/>
+                      </a:pPr>
+                      <a:endParaRPr lang="en-US" sz="1200">
+                        <a:latin typeface="Calibri" panose="020F0502020204030204" charset="0"/>
+                        <a:cs typeface="Calibri" panose="020F0502020204030204" charset="0"/>
+                      </a:endParaRPr>
+                    </a:p>
+                  </a:txBody>
+                  <a:tcPr/>
+                </a:tc>
+                <a:tc>
+                  <a:txBody>
+                    <a:bodyPr/>
+                    <a:p>
+                      <a:pPr>
+                        <a:buNone/>
+                      </a:pPr>
+                      <a:endParaRPr lang="en-US" sz="1200">
+                        <a:latin typeface="Calibri" panose="020F0502020204030204" charset="0"/>
+                        <a:cs typeface="Calibri" panose="020F0502020204030204" charset="0"/>
+                      </a:endParaRPr>
+                    </a:p>
+                  </a:txBody>
+                  <a:tcPr/>
+                </a:tc>
+                <a:tc>
+                  <a:txBody>
+                    <a:bodyPr/>
+                    <a:p>
+                      <a:pPr>
+                        <a:buNone/>
+                      </a:pPr>
+                      <a:r>
+                        <a:rPr lang="en-US" sz="1200">
+                          <a:latin typeface="Calibri" panose="020F0502020204030204" charset="0"/>
+                          <a:cs typeface="Calibri" panose="020F0502020204030204" charset="0"/>
+                          <a:sym typeface="+mn-ea"/>
+                        </a:rPr>
+                        <a:t>Vsd(@Isd)</a:t>
+                      </a:r>
+                      <a:endParaRPr lang="en-US" sz="1200">
+                        <a:latin typeface="Calibri" panose="020F0502020204030204" charset="0"/>
+                        <a:cs typeface="Calibri" panose="020F0502020204030204" charset="0"/>
+                        <a:sym typeface="+mn-ea"/>
+                      </a:endParaRPr>
+                    </a:p>
+                  </a:txBody>
+                  <a:tcPr/>
+                </a:tc>
+              </a:tr>
+              <a:tr h="274320">
+                <a:tc>
+                  <a:txBody>
+                    <a:bodyPr/>
+                    <a:p>
+                      <a:pPr>
+                        <a:buNone/>
+                      </a:pPr>
+                      <a:r>
+                        <a:rPr lang="en-US" sz="1200">
+                          <a:latin typeface="Calibri" panose="020F0502020204030204" charset="0"/>
+                          <a:cs typeface="Calibri" panose="020F0502020204030204" charset="0"/>
+                        </a:rPr>
+                        <a:t>Tj,min (⁰C)</a:t>
+                      </a:r>
+                      <a:endParaRPr lang="en-US" sz="1200">
+                        <a:latin typeface="Calibri" panose="020F0502020204030204" charset="0"/>
+                        <a:cs typeface="Calibri" panose="020F0502020204030204" charset="0"/>
+                      </a:endParaRPr>
+                    </a:p>
+                  </a:txBody>
+                  <a:tcPr/>
+                </a:tc>
+                <a:tc>
+                  <a:txBody>
+                    <a:bodyPr/>
+                    <a:p>
+                      <a:pPr>
+                        <a:buNone/>
+                      </a:pPr>
+                      <a:endParaRPr lang="en-US" sz="1200">
+                        <a:latin typeface="Calibri" panose="020F0502020204030204" charset="0"/>
+                        <a:cs typeface="Calibri" panose="020F0502020204030204" charset="0"/>
+                      </a:endParaRPr>
+                    </a:p>
+                  </a:txBody>
+                  <a:tcPr/>
+                </a:tc>
+                <a:tc>
+                  <a:txBody>
+                    <a:bodyPr/>
+                    <a:p>
+                      <a:pPr>
+                        <a:buNone/>
+                      </a:pPr>
+                      <a:endParaRPr lang="en-US" sz="1200">
+                        <a:latin typeface="Calibri" panose="020F0502020204030204" charset="0"/>
+                        <a:cs typeface="Calibri" panose="020F0502020204030204" charset="0"/>
+                      </a:endParaRPr>
+                    </a:p>
+                  </a:txBody>
+                  <a:tcPr/>
+                </a:tc>
+                <a:tc>
+                  <a:txBody>
+                    <a:bodyPr/>
+                    <a:p>
+                      <a:pPr>
+                        <a:buNone/>
+                      </a:pPr>
+                      <a:endParaRPr lang="en-US" sz="1200">
+                        <a:latin typeface="Calibri" panose="020F0502020204030204" charset="0"/>
+                        <a:cs typeface="Calibri" panose="020F0502020204030204" charset="0"/>
+                      </a:endParaRPr>
+                    </a:p>
+                  </a:txBody>
+                  <a:tcPr/>
+                </a:tc>
+                <a:tc>
+                  <a:txBody>
+                    <a:bodyPr/>
+                    <a:p>
+                      <a:pPr>
+                        <a:buNone/>
+                      </a:pPr>
+                      <a:endParaRPr lang="en-US" sz="1200">
+                        <a:latin typeface="Calibri" panose="020F0502020204030204" charset="0"/>
+                        <a:cs typeface="Calibri" panose="020F0502020204030204" charset="0"/>
+                      </a:endParaRPr>
+                    </a:p>
+                  </a:txBody>
+                  <a:tcPr/>
+                </a:tc>
+                <a:tc>
+                  <a:txBody>
+                    <a:bodyPr/>
+                    <a:p>
+                      <a:pPr>
+                        <a:buNone/>
+                      </a:pPr>
+                      <a:r>
+                        <a:rPr lang="en-US" sz="1200">
+                          <a:latin typeface="Calibri" panose="020F0502020204030204" charset="0"/>
+                          <a:cs typeface="Calibri" panose="020F0502020204030204" charset="0"/>
+                        </a:rPr>
+                        <a:t>Tj,min (⁰C)</a:t>
+                      </a:r>
+                      <a:endParaRPr lang="en-US" sz="1200">
+                        <a:latin typeface="Calibri" panose="020F0502020204030204" charset="0"/>
+                        <a:cs typeface="Calibri" panose="020F0502020204030204" charset="0"/>
+                      </a:endParaRPr>
+                    </a:p>
+                  </a:txBody>
+                  <a:tcPr/>
+                </a:tc>
+              </a:tr>
+              <a:tr h="274320">
+                <a:tc>
+                  <a:txBody>
+                    <a:bodyPr/>
+                    <a:p>
+                      <a:pPr>
+                        <a:buNone/>
+                      </a:pPr>
+                      <a:r>
+                        <a:rPr lang="en-US" sz="1200">
+                          <a:latin typeface="Calibri" panose="020F0502020204030204" charset="0"/>
+                          <a:cs typeface="Calibri" panose="020F0502020204030204" charset="0"/>
+                        </a:rPr>
+                        <a:t>Rds_factor</a:t>
+                      </a:r>
+                      <a:endParaRPr lang="en-US" sz="1200">
+                        <a:latin typeface="Calibri" panose="020F0502020204030204" charset="0"/>
+                        <a:cs typeface="Calibri" panose="020F0502020204030204" charset="0"/>
+                      </a:endParaRPr>
+                    </a:p>
+                  </a:txBody>
+                  <a:tcPr/>
+                </a:tc>
+                <a:tc>
+                  <a:txBody>
+                    <a:bodyPr/>
+                    <a:p>
+                      <a:pPr>
+                        <a:buNone/>
+                      </a:pPr>
+                      <a:endParaRPr lang="en-US" sz="1200">
+                        <a:latin typeface="Calibri" panose="020F0502020204030204" charset="0"/>
+                        <a:cs typeface="Calibri" panose="020F0502020204030204" charset="0"/>
+                      </a:endParaRPr>
+                    </a:p>
+                  </a:txBody>
+                  <a:tcPr/>
+                </a:tc>
+                <a:tc>
+                  <a:txBody>
+                    <a:bodyPr/>
+                    <a:p>
+                      <a:pPr>
+                        <a:buNone/>
+                      </a:pPr>
+                      <a:endParaRPr lang="en-US" sz="1200">
+                        <a:latin typeface="Calibri" panose="020F0502020204030204" charset="0"/>
+                        <a:cs typeface="Calibri" panose="020F0502020204030204" charset="0"/>
+                      </a:endParaRPr>
+                    </a:p>
+                  </a:txBody>
+                  <a:tcPr/>
+                </a:tc>
+                <a:tc>
+                  <a:txBody>
+                    <a:bodyPr/>
+                    <a:p>
+                      <a:pPr>
+                        <a:buNone/>
+                      </a:pPr>
+                      <a:endParaRPr lang="en-US" sz="1200">
+                        <a:latin typeface="Calibri" panose="020F0502020204030204" charset="0"/>
+                        <a:cs typeface="Calibri" panose="020F0502020204030204" charset="0"/>
+                      </a:endParaRPr>
+                    </a:p>
+                  </a:txBody>
+                  <a:tcPr/>
+                </a:tc>
+                <a:tc>
+                  <a:txBody>
+                    <a:bodyPr/>
+                    <a:p>
+                      <a:pPr>
+                        <a:buNone/>
+                      </a:pPr>
+                      <a:endParaRPr lang="en-US" sz="1200">
+                        <a:latin typeface="Calibri" panose="020F0502020204030204" charset="0"/>
+                        <a:cs typeface="Calibri" panose="020F0502020204030204" charset="0"/>
+                      </a:endParaRPr>
+                    </a:p>
+                  </a:txBody>
+                  <a:tcPr/>
+                </a:tc>
+                <a:tc>
+                  <a:txBody>
+                    <a:bodyPr/>
+                    <a:p>
+                      <a:pPr>
+                        <a:buNone/>
+                      </a:pPr>
+                      <a:r>
+                        <a:rPr lang="en-US" sz="1200">
+                          <a:latin typeface="Calibri" panose="020F0502020204030204" charset="0"/>
+                          <a:cs typeface="Calibri" panose="020F0502020204030204" charset="0"/>
+                        </a:rPr>
+                        <a:t>Rds_factor</a:t>
+                      </a:r>
+                      <a:endParaRPr lang="en-US" sz="1200">
+                        <a:latin typeface="Calibri" panose="020F0502020204030204" charset="0"/>
+                        <a:cs typeface="Calibri" panose="020F0502020204030204" charset="0"/>
+                      </a:endParaRPr>
+                    </a:p>
+                  </a:txBody>
+                  <a:tcPr/>
+                </a:tc>
+              </a:tr>
+            </a:tbl>
+          </a:graphicData>
+        </a:graphic>
+      </p:graphicFrame>
+      <p:sp>
+        <p:nvSpPr>
+          <p:cNvPr id="26" name="Text Box 25"/>
           <p:cNvSpPr txBox="1"/>
           <p:nvPr/>
         </p:nvSpPr>
         <p:spPr>
           <a:xfrm>
-            <a:off x="817245" y="1066800"/>
-            <a:ext cx="10527030" cy="2861310"/>
+            <a:off x="6968490" y="3428365"/>
+            <a:ext cx="4839970" cy="3138170"/>
           </a:xfrm>
           <a:prstGeom prst="rect">
             <a:avLst/>
@@ -5900,180 +7000,122 @@
             <a:spAutoFit/>
           </a:bodyPr>
           <a:p>
-            <a:pPr marL="305435" indent="-305435">
+            <a:pPr marL="285750" indent="-285750">
               <a:buFont typeface="Arial" panose="020B0604020202020204" pitchFamily="34" charset="0"/>
               <a:buChar char="•"/>
             </a:pPr>
             <a:r>
               <a:rPr lang="en-US"/>
-              <a:t>An alternative method of transient loss estimation has been developed to be used in Qspice.</a:t>
+              <a:t>The table size must be strictly 7x6 and written with the exact format.</a:t>
             </a:r>
             <a:endParaRPr lang="en-US"/>
           </a:p>
           <a:p>
-            <a:pPr marL="305435" indent="-305435">
+            <a:pPr marL="285750" indent="-285750">
               <a:buFont typeface="Arial" panose="020B0604020202020204" pitchFamily="34" charset="0"/>
               <a:buChar char="•"/>
             </a:pPr>
             <a:r>
-              <a:rPr lang="en-US" altLang="en-US"/>
-              <a:t>The presented method has a number of simplification layers, with the rationale of the approach explained. Note: some reasoning maybe technical, some maybe practical.</a:t>
-            </a:r>
-            <a:endParaRPr lang="en-US" altLang="en-US"/>
-          </a:p>
-          <a:p>
-            <a:pPr marL="305435" indent="-305435">
+              <a:rPr lang="en-US"/>
+              <a:t>Between one collumn to the next, the data is separated by using tab (tab delimited data).</a:t>
+            </a:r>
+            <a:endParaRPr lang="en-US"/>
+          </a:p>
+          <a:p>
+            <a:pPr marL="285750" indent="-285750">
               <a:buFont typeface="Arial" panose="020B0604020202020204" pitchFamily="34" charset="0"/>
               <a:buChar char="•"/>
             </a:pPr>
             <a:r>
-              <a:rPr lang="en-US" altLang="en-US"/>
-              <a:t>Simulation result accuracy for the SR-boost test circuit after some comparison with Wolfspeed’s speedfit appears to be quite reasonable (I cant find Infineon’s losses simulator). This result allows me to then use the method to evaluate losses for more complex circuit (e.g. Three phase Active NPC).</a:t>
-            </a:r>
-            <a:endParaRPr lang="en-US" altLang="en-US"/>
-          </a:p>
-          <a:p>
-            <a:pPr marL="305435" indent="-305435">
-              <a:buFont typeface="Arial" panose="020B0604020202020204" pitchFamily="34" charset="0"/>
-              <a:buChar char="•"/>
-            </a:pPr>
-            <a:r>
-              <a:rPr lang="en-US" altLang="en-US"/>
-              <a:t>Overall, this tool I believe is a very powerful tool for every power supply engineer.</a:t>
-            </a:r>
-            <a:endParaRPr lang="en-US" altLang="en-US"/>
-          </a:p>
-          <a:p>
-            <a:pPr marL="305435" indent="-305435">
-              <a:buFont typeface="Arial" panose="020B0604020202020204" pitchFamily="34" charset="0"/>
-              <a:buChar char="•"/>
-            </a:pPr>
-            <a:endParaRPr lang="en-US" altLang="en-US"/>
-          </a:p>
-          <a:p>
-            <a:pPr marL="305435" indent="-305435">
-              <a:buFont typeface="Arial" panose="020B0604020202020204" pitchFamily="34" charset="0"/>
-              <a:buChar char="•"/>
-            </a:pPr>
-            <a:endParaRPr lang="en-US" altLang="en-US"/>
-          </a:p>
-          <a:p>
-            <a:pPr indent="0">
-              <a:buFont typeface="Arial" panose="020B0604020202020204" pitchFamily="34" charset="0"/>
-              <a:buNone/>
-            </a:pPr>
-            <a:r>
-              <a:rPr lang="en-US" altLang="en-US"/>
-              <a:t>Next? for IGBT?</a:t>
-            </a:r>
-            <a:endParaRPr lang="en-US" altLang="en-US"/>
-          </a:p>
-        </p:txBody>
-      </p:sp>
-      <p:sp>
-        <p:nvSpPr>
-          <p:cNvPr id="2" name="Text Box 1"/>
-          <p:cNvSpPr txBox="1"/>
+              <a:rPr lang="en-US"/>
+              <a:t>The losses Eoss and body diode are calculated by taking linear interpolation from the losses table. </a:t>
+            </a:r>
+            <a:r>
+              <a:rPr lang="en-US" b="1"/>
+              <a:t>The data table dont need to be equally spaced</a:t>
+            </a:r>
+            <a:r>
+              <a:rPr lang="en-US"/>
+              <a:t>. If the Vds or Id is greater than the highest value in the datasheet, the Eoss and Vsd are assumed to be equal to the maximum value on the table.</a:t>
+            </a:r>
+            <a:endParaRPr lang="en-US"/>
+          </a:p>
+        </p:txBody>
+      </p:sp>
+      <p:pic>
+        <p:nvPicPr>
+          <p:cNvPr id="10" name="Picture 9"/>
+          <p:cNvPicPr>
+            <a:picLocks noChangeAspect="1"/>
+          </p:cNvPicPr>
           <p:nvPr/>
-        </p:nvSpPr>
-        <p:spPr>
-          <a:xfrm>
-            <a:off x="817245" y="4824095"/>
-            <a:ext cx="10535920" cy="1198880"/>
+        </p:nvPicPr>
+        <p:blipFill>
+          <a:blip r:embed="rId2"/>
+          <a:stretch>
+            <a:fillRect/>
+          </a:stretch>
+        </p:blipFill>
+        <p:spPr>
+          <a:xfrm>
+            <a:off x="880745" y="3192145"/>
+            <a:ext cx="5792470" cy="2911475"/>
           </a:xfrm>
           <a:prstGeom prst="rect">
             <a:avLst/>
           </a:prstGeom>
-          <a:noFill/>
-        </p:spPr>
-        <p:txBody>
-          <a:bodyPr wrap="square" rtlCol="0" anchor="t">
-            <a:spAutoFit/>
+        </p:spPr>
+      </p:pic>
+    </p:spTree>
+  </p:cSld>
+  <p:clrMapOvr>
+    <a:masterClrMapping/>
+  </p:clrMapOvr>
+</p:sld>
+</file>
+
+<file path=ppt/slides/slide15.xml><?xml version="1.0" encoding="utf-8"?>
+<p:sld xmlns:a="http://schemas.openxmlformats.org/drawingml/2006/main" xmlns:r="http://schemas.openxmlformats.org/officeDocument/2006/relationships" xmlns:p="http://schemas.openxmlformats.org/presentationml/2006/main">
+  <p:cSld>
+    <p:spTree>
+      <p:nvGrpSpPr>
+        <p:cNvPr id="1" name=""/>
+        <p:cNvGrpSpPr/>
+        <p:nvPr/>
+      </p:nvGrpSpPr>
+      <p:grpSpPr>
+        <a:xfrm>
+          <a:off x="0" y="0"/>
+          <a:ext cx="0" cy="0"/>
+          <a:chOff x="0" y="0"/>
+          <a:chExt cx="0" cy="0"/>
+        </a:xfrm>
+      </p:grpSpPr>
+      <p:sp>
+        <p:nvSpPr>
+          <p:cNvPr id="5" name="Title 4"/>
+          <p:cNvSpPr>
+            <a:spLocks noGrp="1"/>
+          </p:cNvSpPr>
+          <p:nvPr>
+            <p:ph type="title"/>
+          </p:nvPr>
+        </p:nvSpPr>
+        <p:spPr>
+          <a:xfrm>
+            <a:off x="838200" y="365125"/>
+            <a:ext cx="10515600" cy="619613"/>
+          </a:xfrm>
+        </p:spPr>
+        <p:txBody>
+          <a:bodyPr>
+            <a:normAutofit fontScale="90000"/>
           </a:bodyPr>
-          <a:p>
-            <a:pPr marL="305435" indent="-305435"/>
-            <a:r>
-              <a:rPr lang="en-US">
-                <a:sym typeface="+mn-ea"/>
-              </a:rPr>
-              <a:t>[1] Infineon </a:t>
-            </a:r>
-            <a:r>
-              <a:rPr lang="en-US" altLang="en-US">
-                <a:sym typeface="+mn-ea"/>
-              </a:rPr>
-              <a:t>IMZA75R040M1H - Datasheet</a:t>
-            </a:r>
-            <a:endParaRPr lang="en-US" altLang="en-US"/>
-          </a:p>
-          <a:p>
-            <a:pPr marL="305435" indent="-305435"/>
-            <a:r>
-              <a:rPr lang="en-US" altLang="en-US">
-                <a:sym typeface="+mn-ea"/>
-              </a:rPr>
-              <a:t>[2] Infineon IMW120R040M1H - Datasheet</a:t>
-            </a:r>
-            <a:endParaRPr lang="en-US" altLang="en-US"/>
-          </a:p>
-          <a:p>
-            <a:pPr marL="305435" indent="-305435"/>
-            <a:r>
-              <a:rPr lang="en-US" altLang="en-US">
-                <a:sym typeface="+mn-ea"/>
-              </a:rPr>
-              <a:t>[3] Estimating SiC MOSFET switching losses in applications https://community.infineon.com/t5/Knowledge-Base-Articles/Estimating-SiC-MOSFET-switching-losses-in-applications/ta-p/709113</a:t>
-            </a:r>
-            <a:endParaRPr lang="en-US" altLang="en-US">
-              <a:sym typeface="+mn-ea"/>
-            </a:endParaRPr>
-          </a:p>
-        </p:txBody>
-      </p:sp>
-      <p:sp>
-        <p:nvSpPr>
-          <p:cNvPr id="10" name="Title 4"/>
-          <p:cNvSpPr>
-            <a:spLocks noGrp="1"/>
-          </p:cNvSpPr>
-          <p:nvPr/>
-        </p:nvSpPr>
-        <p:spPr>
-          <a:xfrm>
-            <a:off x="828675" y="4232275"/>
-            <a:ext cx="10515600" cy="619613"/>
-          </a:xfrm>
-          <a:prstGeom prst="rect">
-            <a:avLst/>
-          </a:prstGeom>
-        </p:spPr>
-        <p:txBody>
-          <a:bodyPr vert="horz" lIns="91440" tIns="45720" rIns="91440" bIns="45720" rtlCol="0" anchor="ctr">
-            <a:normAutofit fontScale="70000"/>
-          </a:bodyPr>
-          <a:lstStyle>
-            <a:lvl1pPr algn="l" defTabSz="914400" rtl="0" eaLnBrk="1" latinLnBrk="0" hangingPunct="1">
-              <a:lnSpc>
-                <a:spcPct val="90000"/>
-              </a:lnSpc>
-              <a:spcBef>
-                <a:spcPct val="0"/>
-              </a:spcBef>
-              <a:buNone/>
-              <a:defRPr sz="4400" kern="1200">
-                <a:solidFill>
-                  <a:schemeClr val="tx1"/>
-                </a:solidFill>
-                <a:latin typeface="+mj-lt"/>
-                <a:ea typeface="+mj-ea"/>
-                <a:cs typeface="+mj-cs"/>
-              </a:defRPr>
-            </a:lvl1pPr>
-          </a:lstStyle>
+          <a:lstStyle/>
           <a:p>
             <a:r>
               <a:rPr lang="en-US" dirty="0"/>
-              <a:t>References</a:t>
+              <a:t>Simulation test result (for Rev.0)</a:t>
             </a:r>
             <a:endParaRPr lang="en-US" dirty="0"/>
           </a:p>
@@ -6081,13 +7123,13 @@
       </p:sp>
       <p:cxnSp>
         <p:nvCxnSpPr>
-          <p:cNvPr id="11" name="Straight Connector 10"/>
+          <p:cNvPr id="8" name="Straight Connector 7"/>
           <p:cNvCxnSpPr/>
           <p:nvPr/>
         </p:nvCxnSpPr>
         <p:spPr>
           <a:xfrm>
-            <a:off x="816949" y="4807928"/>
+            <a:off x="826474" y="940778"/>
             <a:ext cx="10527326" cy="0"/>
           </a:xfrm>
           <a:prstGeom prst="line">
@@ -6112,13 +7154,13 @@
       </p:cxnSp>
       <p:cxnSp>
         <p:nvCxnSpPr>
-          <p:cNvPr id="12" name="Straight Connector 11"/>
+          <p:cNvPr id="9" name="Straight Connector 8"/>
           <p:cNvCxnSpPr/>
           <p:nvPr/>
         </p:nvCxnSpPr>
         <p:spPr>
           <a:xfrm>
-            <a:off x="816949" y="4235207"/>
+            <a:off x="826474" y="368057"/>
             <a:ext cx="10527326" cy="0"/>
           </a:xfrm>
           <a:prstGeom prst="line">
@@ -6141,6 +7183,751 @@
           </a:fontRef>
         </p:style>
       </p:cxnSp>
+      <p:sp>
+        <p:nvSpPr>
+          <p:cNvPr id="7" name="Footer Placeholder 6"/>
+          <p:cNvSpPr>
+            <a:spLocks noGrp="1"/>
+          </p:cNvSpPr>
+          <p:nvPr>
+            <p:ph type="ftr" sz="quarter" idx="11"/>
+          </p:nvPr>
+        </p:nvSpPr>
+        <p:spPr/>
+        <p:txBody>
+          <a:bodyPr/>
+          <a:lstStyle/>
+          <a:p>
+            <a:r>
+              <a:rPr lang="en-US"/>
+              <a:t>By Arief Noor Rahman </a:t>
+            </a:r>
+            <a:r>
+              <a:rPr lang="en-US">
+                <a:latin typeface="SimSun" panose="02010600030101010101" pitchFamily="2" charset="-122"/>
+                <a:ea typeface="SimSun" panose="02010600030101010101" pitchFamily="2" charset="-122"/>
+              </a:rPr>
+              <a:t>－</a:t>
+            </a:r>
+            <a:r>
+              <a:rPr lang="en-US">
+                <a:sym typeface="+mn-ea"/>
+              </a:rPr>
+              <a:t>Power Control Design</a:t>
+            </a:r>
+            <a:endParaRPr lang="en-US">
+              <a:latin typeface="SimSun" panose="02010600030101010101" pitchFamily="2" charset="-122"/>
+              <a:ea typeface="SimSun" panose="02010600030101010101" pitchFamily="2" charset="-122"/>
+            </a:endParaRPr>
+          </a:p>
+        </p:txBody>
+      </p:sp>
+      <p:sp>
+        <p:nvSpPr>
+          <p:cNvPr id="3" name="Slide Number Placeholder 2"/>
+          <p:cNvSpPr>
+            <a:spLocks noGrp="1"/>
+          </p:cNvSpPr>
+          <p:nvPr>
+            <p:ph type="sldNum" sz="quarter" idx="12"/>
+          </p:nvPr>
+        </p:nvSpPr>
+        <p:spPr/>
+        <p:txBody>
+          <a:bodyPr/>
+          <a:lstStyle/>
+          <a:p>
+            <a:fld id="{9B618960-8005-486C-9A75-10CB2AAC16F9}" type="slidenum">
+              <a:rPr lang="en-US" smtClean="0"/>
+            </a:fld>
+            <a:endParaRPr lang="en-US"/>
+          </a:p>
+        </p:txBody>
+      </p:sp>
+      <p:pic>
+        <p:nvPicPr>
+          <p:cNvPr id="4" name="Picture 3" descr="logo_detail"/>
+          <p:cNvPicPr>
+            <a:picLocks noChangeAspect="1"/>
+          </p:cNvPicPr>
+          <p:nvPr/>
+        </p:nvPicPr>
+        <p:blipFill>
+          <a:blip r:embed="rId1"/>
+          <a:stretch>
+            <a:fillRect/>
+          </a:stretch>
+        </p:blipFill>
+        <p:spPr>
+          <a:xfrm>
+            <a:off x="120650" y="6024880"/>
+            <a:ext cx="696595" cy="696595"/>
+          </a:xfrm>
+          <a:prstGeom prst="rect">
+            <a:avLst/>
+          </a:prstGeom>
+        </p:spPr>
+      </p:pic>
+      <p:pic>
+        <p:nvPicPr>
+          <p:cNvPr id="16" name="Picture 15"/>
+          <p:cNvPicPr>
+            <a:picLocks noChangeAspect="1"/>
+          </p:cNvPicPr>
+          <p:nvPr/>
+        </p:nvPicPr>
+        <p:blipFill>
+          <a:blip r:embed="rId2"/>
+          <a:stretch>
+            <a:fillRect/>
+          </a:stretch>
+        </p:blipFill>
+        <p:spPr>
+          <a:xfrm>
+            <a:off x="1007110" y="2261870"/>
+            <a:ext cx="4911090" cy="3977640"/>
+          </a:xfrm>
+          <a:prstGeom prst="rect">
+            <a:avLst/>
+          </a:prstGeom>
+        </p:spPr>
+      </p:pic>
+      <p:pic>
+        <p:nvPicPr>
+          <p:cNvPr id="18" name="Picture 17"/>
+          <p:cNvPicPr>
+            <a:picLocks noChangeAspect="1"/>
+          </p:cNvPicPr>
+          <p:nvPr/>
+        </p:nvPicPr>
+        <p:blipFill>
+          <a:blip r:embed="rId3"/>
+          <a:stretch>
+            <a:fillRect/>
+          </a:stretch>
+        </p:blipFill>
+        <p:spPr>
+          <a:xfrm>
+            <a:off x="6972300" y="1097915"/>
+            <a:ext cx="4381500" cy="5258435"/>
+          </a:xfrm>
+          <a:prstGeom prst="rect">
+            <a:avLst/>
+          </a:prstGeom>
+        </p:spPr>
+      </p:pic>
+      <p:sp>
+        <p:nvSpPr>
+          <p:cNvPr id="2" name="Text Box 1"/>
+          <p:cNvSpPr txBox="1"/>
+          <p:nvPr/>
+        </p:nvSpPr>
+        <p:spPr>
+          <a:xfrm>
+            <a:off x="1007110" y="1140460"/>
+            <a:ext cx="5269230" cy="922020"/>
+          </a:xfrm>
+          <a:prstGeom prst="rect">
+            <a:avLst/>
+          </a:prstGeom>
+          <a:noFill/>
+        </p:spPr>
+        <p:txBody>
+          <a:bodyPr wrap="square" rtlCol="0">
+            <a:spAutoFit/>
+          </a:bodyPr>
+          <a:p>
+            <a:r>
+              <a:rPr lang="en-US"/>
+              <a:t>To use the losses estimation tool, user will need to connect the block to DUT switch and measure all Vgs signal, Vds signal, and drain current as following figure.</a:t>
+            </a:r>
+            <a:endParaRPr lang="en-US"/>
+          </a:p>
+        </p:txBody>
+      </p:sp>
+    </p:spTree>
+  </p:cSld>
+  <p:clrMapOvr>
+    <a:masterClrMapping/>
+  </p:clrMapOvr>
+</p:sld>
+</file>
+
+<file path=ppt/slides/slide16.xml><?xml version="1.0" encoding="utf-8"?>
+<p:sld xmlns:a="http://schemas.openxmlformats.org/drawingml/2006/main" xmlns:r="http://schemas.openxmlformats.org/officeDocument/2006/relationships" xmlns:p="http://schemas.openxmlformats.org/presentationml/2006/main">
+  <p:cSld>
+    <p:spTree>
+      <p:nvGrpSpPr>
+        <p:cNvPr id="1" name=""/>
+        <p:cNvGrpSpPr/>
+        <p:nvPr/>
+      </p:nvGrpSpPr>
+      <p:grpSpPr>
+        <a:xfrm>
+          <a:off x="0" y="0"/>
+          <a:ext cx="0" cy="0"/>
+          <a:chOff x="0" y="0"/>
+          <a:chExt cx="0" cy="0"/>
+        </a:xfrm>
+      </p:grpSpPr>
+      <p:sp>
+        <p:nvSpPr>
+          <p:cNvPr id="5" name="Title 4"/>
+          <p:cNvSpPr>
+            <a:spLocks noGrp="1"/>
+          </p:cNvSpPr>
+          <p:nvPr>
+            <p:ph type="title"/>
+          </p:nvPr>
+        </p:nvSpPr>
+        <p:spPr>
+          <a:xfrm>
+            <a:off x="838200" y="365125"/>
+            <a:ext cx="10515600" cy="619613"/>
+          </a:xfrm>
+        </p:spPr>
+        <p:txBody>
+          <a:bodyPr>
+            <a:normAutofit fontScale="90000"/>
+          </a:bodyPr>
+          <a:lstStyle/>
+          <a:p>
+            <a:r>
+              <a:rPr lang="en-US" dirty="0"/>
+              <a:t>Simulation test result (for Rev.1)</a:t>
+            </a:r>
+            <a:endParaRPr lang="en-US" dirty="0"/>
+          </a:p>
+        </p:txBody>
+      </p:sp>
+      <p:cxnSp>
+        <p:nvCxnSpPr>
+          <p:cNvPr id="8" name="Straight Connector 7"/>
+          <p:cNvCxnSpPr/>
+          <p:nvPr/>
+        </p:nvCxnSpPr>
+        <p:spPr>
+          <a:xfrm>
+            <a:off x="826474" y="940778"/>
+            <a:ext cx="10527326" cy="0"/>
+          </a:xfrm>
+          <a:prstGeom prst="line">
+            <a:avLst/>
+          </a:prstGeom>
+          <a:ln w="28575"/>
+        </p:spPr>
+        <p:style>
+          <a:lnRef idx="1">
+            <a:schemeClr val="accent1"/>
+          </a:lnRef>
+          <a:fillRef idx="0">
+            <a:schemeClr val="accent1"/>
+          </a:fillRef>
+          <a:effectRef idx="0">
+            <a:schemeClr val="accent1"/>
+          </a:effectRef>
+          <a:fontRef idx="minor">
+            <a:schemeClr val="tx1"/>
+          </a:fontRef>
+        </p:style>
+      </p:cxnSp>
+      <p:cxnSp>
+        <p:nvCxnSpPr>
+          <p:cNvPr id="9" name="Straight Connector 8"/>
+          <p:cNvCxnSpPr/>
+          <p:nvPr/>
+        </p:nvCxnSpPr>
+        <p:spPr>
+          <a:xfrm>
+            <a:off x="826474" y="368057"/>
+            <a:ext cx="10527326" cy="0"/>
+          </a:xfrm>
+          <a:prstGeom prst="line">
+            <a:avLst/>
+          </a:prstGeom>
+          <a:ln w="28575"/>
+        </p:spPr>
+        <p:style>
+          <a:lnRef idx="1">
+            <a:schemeClr val="accent1"/>
+          </a:lnRef>
+          <a:fillRef idx="0">
+            <a:schemeClr val="accent1"/>
+          </a:fillRef>
+          <a:effectRef idx="0">
+            <a:schemeClr val="accent1"/>
+          </a:effectRef>
+          <a:fontRef idx="minor">
+            <a:schemeClr val="tx1"/>
+          </a:fontRef>
+        </p:style>
+      </p:cxnSp>
+      <p:sp>
+        <p:nvSpPr>
+          <p:cNvPr id="7" name="Footer Placeholder 6"/>
+          <p:cNvSpPr>
+            <a:spLocks noGrp="1"/>
+          </p:cNvSpPr>
+          <p:nvPr>
+            <p:ph type="ftr" sz="quarter" idx="11"/>
+          </p:nvPr>
+        </p:nvSpPr>
+        <p:spPr/>
+        <p:txBody>
+          <a:bodyPr/>
+          <a:lstStyle/>
+          <a:p>
+            <a:r>
+              <a:rPr lang="en-US"/>
+              <a:t>By Arief Noor Rahman </a:t>
+            </a:r>
+            <a:r>
+              <a:rPr lang="en-US">
+                <a:latin typeface="SimSun" panose="02010600030101010101" pitchFamily="2" charset="-122"/>
+                <a:ea typeface="SimSun" panose="02010600030101010101" pitchFamily="2" charset="-122"/>
+              </a:rPr>
+              <a:t>－</a:t>
+            </a:r>
+            <a:r>
+              <a:rPr lang="en-US">
+                <a:sym typeface="+mn-ea"/>
+              </a:rPr>
+              <a:t>Power Control Design</a:t>
+            </a:r>
+            <a:endParaRPr lang="en-US">
+              <a:latin typeface="SimSun" panose="02010600030101010101" pitchFamily="2" charset="-122"/>
+              <a:ea typeface="SimSun" panose="02010600030101010101" pitchFamily="2" charset="-122"/>
+            </a:endParaRPr>
+          </a:p>
+        </p:txBody>
+      </p:sp>
+      <p:sp>
+        <p:nvSpPr>
+          <p:cNvPr id="3" name="Slide Number Placeholder 2"/>
+          <p:cNvSpPr>
+            <a:spLocks noGrp="1"/>
+          </p:cNvSpPr>
+          <p:nvPr>
+            <p:ph type="sldNum" sz="quarter" idx="12"/>
+          </p:nvPr>
+        </p:nvSpPr>
+        <p:spPr/>
+        <p:txBody>
+          <a:bodyPr/>
+          <a:lstStyle/>
+          <a:p>
+            <a:fld id="{9B618960-8005-486C-9A75-10CB2AAC16F9}" type="slidenum">
+              <a:rPr lang="en-US" smtClean="0"/>
+            </a:fld>
+            <a:endParaRPr lang="en-US"/>
+          </a:p>
+        </p:txBody>
+      </p:sp>
+      <p:pic>
+        <p:nvPicPr>
+          <p:cNvPr id="4" name="Picture 3" descr="logo_detail"/>
+          <p:cNvPicPr>
+            <a:picLocks noChangeAspect="1"/>
+          </p:cNvPicPr>
+          <p:nvPr/>
+        </p:nvPicPr>
+        <p:blipFill>
+          <a:blip r:embed="rId1"/>
+          <a:stretch>
+            <a:fillRect/>
+          </a:stretch>
+        </p:blipFill>
+        <p:spPr>
+          <a:xfrm>
+            <a:off x="120650" y="6024880"/>
+            <a:ext cx="696595" cy="696595"/>
+          </a:xfrm>
+          <a:prstGeom prst="rect">
+            <a:avLst/>
+          </a:prstGeom>
+        </p:spPr>
+      </p:pic>
+      <p:pic>
+        <p:nvPicPr>
+          <p:cNvPr id="10" name="Picture 9"/>
+          <p:cNvPicPr>
+            <a:picLocks noChangeAspect="1"/>
+          </p:cNvPicPr>
+          <p:nvPr/>
+        </p:nvPicPr>
+        <p:blipFill>
+          <a:blip r:embed="rId2"/>
+          <a:stretch>
+            <a:fillRect/>
+          </a:stretch>
+        </p:blipFill>
+        <p:spPr>
+          <a:xfrm>
+            <a:off x="1007110" y="2482215"/>
+            <a:ext cx="5144135" cy="3854450"/>
+          </a:xfrm>
+          <a:prstGeom prst="rect">
+            <a:avLst/>
+          </a:prstGeom>
+        </p:spPr>
+      </p:pic>
+      <p:sp>
+        <p:nvSpPr>
+          <p:cNvPr id="6" name="Text Box 5"/>
+          <p:cNvSpPr txBox="1"/>
+          <p:nvPr/>
+        </p:nvSpPr>
+        <p:spPr>
+          <a:xfrm>
+            <a:off x="1007110" y="1140460"/>
+            <a:ext cx="5269230" cy="1322070"/>
+          </a:xfrm>
+          <a:prstGeom prst="rect">
+            <a:avLst/>
+          </a:prstGeom>
+          <a:noFill/>
+        </p:spPr>
+        <p:txBody>
+          <a:bodyPr wrap="square" rtlCol="0">
+            <a:spAutoFit/>
+          </a:bodyPr>
+          <a:p>
+            <a:r>
+              <a:rPr lang="en-US" sz="1600"/>
+              <a:t>User can now directly set the losses analysis at a certain temperature to improve the model accuracy. Furthermore, if you feel need more challenge, you can easily create the thermal circuit model and loop back the Tj estimate into the losses analyzer block.</a:t>
+            </a:r>
+            <a:endParaRPr lang="en-US" sz="1600"/>
+          </a:p>
+        </p:txBody>
+      </p:sp>
+      <p:pic>
+        <p:nvPicPr>
+          <p:cNvPr id="11" name="Picture 10"/>
+          <p:cNvPicPr>
+            <a:picLocks noChangeAspect="1"/>
+          </p:cNvPicPr>
+          <p:nvPr/>
+        </p:nvPicPr>
+        <p:blipFill>
+          <a:blip r:embed="rId3"/>
+          <a:stretch>
+            <a:fillRect/>
+          </a:stretch>
+        </p:blipFill>
+        <p:spPr>
+          <a:xfrm>
+            <a:off x="6769100" y="1033780"/>
+            <a:ext cx="4463415" cy="5356860"/>
+          </a:xfrm>
+          <a:prstGeom prst="rect">
+            <a:avLst/>
+          </a:prstGeom>
+        </p:spPr>
+      </p:pic>
+    </p:spTree>
+  </p:cSld>
+  <p:clrMapOvr>
+    <a:masterClrMapping/>
+  </p:clrMapOvr>
+</p:sld>
+</file>
+
+<file path=ppt/slides/slide17.xml><?xml version="1.0" encoding="utf-8"?>
+<p:sld xmlns:a="http://schemas.openxmlformats.org/drawingml/2006/main" xmlns:r="http://schemas.openxmlformats.org/officeDocument/2006/relationships" xmlns:p="http://schemas.openxmlformats.org/presentationml/2006/main">
+  <p:cSld>
+    <p:spTree>
+      <p:nvGrpSpPr>
+        <p:cNvPr id="1" name=""/>
+        <p:cNvGrpSpPr/>
+        <p:nvPr/>
+      </p:nvGrpSpPr>
+      <p:grpSpPr>
+        <a:xfrm>
+          <a:off x="0" y="0"/>
+          <a:ext cx="0" cy="0"/>
+          <a:chOff x="0" y="0"/>
+          <a:chExt cx="0" cy="0"/>
+        </a:xfrm>
+      </p:grpSpPr>
+      <p:sp>
+        <p:nvSpPr>
+          <p:cNvPr id="5" name="Title 4"/>
+          <p:cNvSpPr>
+            <a:spLocks noGrp="1"/>
+          </p:cNvSpPr>
+          <p:nvPr>
+            <p:ph type="title"/>
+          </p:nvPr>
+        </p:nvSpPr>
+        <p:spPr>
+          <a:xfrm>
+            <a:off x="838200" y="365125"/>
+            <a:ext cx="10515600" cy="619613"/>
+          </a:xfrm>
+        </p:spPr>
+        <p:txBody>
+          <a:bodyPr>
+            <a:normAutofit fontScale="90000"/>
+          </a:bodyPr>
+          <a:lstStyle/>
+          <a:p>
+            <a:r>
+              <a:rPr lang="en-US" dirty="0"/>
+              <a:t>Simulation test result (for Rev.1)</a:t>
+            </a:r>
+            <a:endParaRPr lang="en-US" dirty="0"/>
+          </a:p>
+        </p:txBody>
+      </p:sp>
+      <p:cxnSp>
+        <p:nvCxnSpPr>
+          <p:cNvPr id="8" name="Straight Connector 7"/>
+          <p:cNvCxnSpPr/>
+          <p:nvPr/>
+        </p:nvCxnSpPr>
+        <p:spPr>
+          <a:xfrm>
+            <a:off x="826474" y="940778"/>
+            <a:ext cx="10527326" cy="0"/>
+          </a:xfrm>
+          <a:prstGeom prst="line">
+            <a:avLst/>
+          </a:prstGeom>
+          <a:ln w="28575"/>
+        </p:spPr>
+        <p:style>
+          <a:lnRef idx="1">
+            <a:schemeClr val="accent1"/>
+          </a:lnRef>
+          <a:fillRef idx="0">
+            <a:schemeClr val="accent1"/>
+          </a:fillRef>
+          <a:effectRef idx="0">
+            <a:schemeClr val="accent1"/>
+          </a:effectRef>
+          <a:fontRef idx="minor">
+            <a:schemeClr val="tx1"/>
+          </a:fontRef>
+        </p:style>
+      </p:cxnSp>
+      <p:cxnSp>
+        <p:nvCxnSpPr>
+          <p:cNvPr id="9" name="Straight Connector 8"/>
+          <p:cNvCxnSpPr/>
+          <p:nvPr/>
+        </p:nvCxnSpPr>
+        <p:spPr>
+          <a:xfrm>
+            <a:off x="826474" y="368057"/>
+            <a:ext cx="10527326" cy="0"/>
+          </a:xfrm>
+          <a:prstGeom prst="line">
+            <a:avLst/>
+          </a:prstGeom>
+          <a:ln w="28575"/>
+        </p:spPr>
+        <p:style>
+          <a:lnRef idx="1">
+            <a:schemeClr val="accent1"/>
+          </a:lnRef>
+          <a:fillRef idx="0">
+            <a:schemeClr val="accent1"/>
+          </a:fillRef>
+          <a:effectRef idx="0">
+            <a:schemeClr val="accent1"/>
+          </a:effectRef>
+          <a:fontRef idx="minor">
+            <a:schemeClr val="tx1"/>
+          </a:fontRef>
+        </p:style>
+      </p:cxnSp>
+      <p:sp>
+        <p:nvSpPr>
+          <p:cNvPr id="7" name="Footer Placeholder 6"/>
+          <p:cNvSpPr>
+            <a:spLocks noGrp="1"/>
+          </p:cNvSpPr>
+          <p:nvPr>
+            <p:ph type="ftr" sz="quarter" idx="11"/>
+          </p:nvPr>
+        </p:nvSpPr>
+        <p:spPr/>
+        <p:txBody>
+          <a:bodyPr/>
+          <a:lstStyle/>
+          <a:p>
+            <a:r>
+              <a:rPr lang="en-US"/>
+              <a:t>By Arief Noor Rahman </a:t>
+            </a:r>
+            <a:r>
+              <a:rPr lang="en-US">
+                <a:latin typeface="SimSun" panose="02010600030101010101" pitchFamily="2" charset="-122"/>
+                <a:ea typeface="SimSun" panose="02010600030101010101" pitchFamily="2" charset="-122"/>
+              </a:rPr>
+              <a:t>－</a:t>
+            </a:r>
+            <a:r>
+              <a:rPr lang="en-US">
+                <a:sym typeface="+mn-ea"/>
+              </a:rPr>
+              <a:t>Power Control Design</a:t>
+            </a:r>
+            <a:endParaRPr lang="en-US">
+              <a:latin typeface="SimSun" panose="02010600030101010101" pitchFamily="2" charset="-122"/>
+              <a:ea typeface="SimSun" panose="02010600030101010101" pitchFamily="2" charset="-122"/>
+            </a:endParaRPr>
+          </a:p>
+        </p:txBody>
+      </p:sp>
+      <p:sp>
+        <p:nvSpPr>
+          <p:cNvPr id="3" name="Slide Number Placeholder 2"/>
+          <p:cNvSpPr>
+            <a:spLocks noGrp="1"/>
+          </p:cNvSpPr>
+          <p:nvPr>
+            <p:ph type="sldNum" sz="quarter" idx="12"/>
+          </p:nvPr>
+        </p:nvSpPr>
+        <p:spPr/>
+        <p:txBody>
+          <a:bodyPr/>
+          <a:lstStyle/>
+          <a:p>
+            <a:fld id="{9B618960-8005-486C-9A75-10CB2AAC16F9}" type="slidenum">
+              <a:rPr lang="en-US" smtClean="0"/>
+            </a:fld>
+            <a:endParaRPr lang="en-US"/>
+          </a:p>
+        </p:txBody>
+      </p:sp>
+      <p:pic>
+        <p:nvPicPr>
+          <p:cNvPr id="4" name="Picture 3" descr="logo_detail"/>
+          <p:cNvPicPr>
+            <a:picLocks noChangeAspect="1"/>
+          </p:cNvPicPr>
+          <p:nvPr/>
+        </p:nvPicPr>
+        <p:blipFill>
+          <a:blip r:embed="rId1"/>
+          <a:stretch>
+            <a:fillRect/>
+          </a:stretch>
+        </p:blipFill>
+        <p:spPr>
+          <a:xfrm>
+            <a:off x="120650" y="6024880"/>
+            <a:ext cx="696595" cy="696595"/>
+          </a:xfrm>
+          <a:prstGeom prst="rect">
+            <a:avLst/>
+          </a:prstGeom>
+        </p:spPr>
+      </p:pic>
+      <p:pic>
+        <p:nvPicPr>
+          <p:cNvPr id="12" name="Picture 11"/>
+          <p:cNvPicPr>
+            <a:picLocks noChangeAspect="1"/>
+          </p:cNvPicPr>
+          <p:nvPr/>
+        </p:nvPicPr>
+        <p:blipFill>
+          <a:blip r:embed="rId2"/>
+          <a:srcRect l="344" t="9835" r="50002" b="10444"/>
+          <a:stretch>
+            <a:fillRect/>
+          </a:stretch>
+        </p:blipFill>
+        <p:spPr>
+          <a:xfrm>
+            <a:off x="1218565" y="1907540"/>
+            <a:ext cx="4686300" cy="4504690"/>
+          </a:xfrm>
+          <a:prstGeom prst="rect">
+            <a:avLst/>
+          </a:prstGeom>
+        </p:spPr>
+      </p:pic>
+      <p:sp>
+        <p:nvSpPr>
+          <p:cNvPr id="13" name="Text Box 12"/>
+          <p:cNvSpPr txBox="1"/>
+          <p:nvPr/>
+        </p:nvSpPr>
+        <p:spPr>
+          <a:xfrm>
+            <a:off x="1218565" y="984885"/>
+            <a:ext cx="5354320" cy="1229995"/>
+          </a:xfrm>
+          <a:prstGeom prst="rect">
+            <a:avLst/>
+          </a:prstGeom>
+          <a:noFill/>
+        </p:spPr>
+        <p:txBody>
+          <a:bodyPr wrap="square" rtlCol="0">
+            <a:spAutoFit/>
+          </a:bodyPr>
+          <a:p>
+            <a:r>
+              <a:rPr lang="en-US" sz="1400"/>
+              <a:t>Example test on T-type Inverter under</a:t>
+            </a:r>
+            <a:endParaRPr lang="en-US" sz="1400"/>
+          </a:p>
+          <a:p>
+            <a:r>
+              <a:rPr lang="en-US" sz="1000"/>
+              <a:t>AC-&gt;DC power flow (at time &lt; 0.5s) and DC-&gt;AC power flow (at time &gt; 0.5s)</a:t>
+            </a:r>
+            <a:endParaRPr lang="en-US" sz="1000"/>
+          </a:p>
+          <a:p>
+            <a:endParaRPr lang="en-US" sz="1000">
+              <a:sym typeface="+mn-ea"/>
+            </a:endParaRPr>
+          </a:p>
+          <a:p>
+            <a:r>
+              <a:rPr lang="en-US" sz="1000">
+                <a:sym typeface="+mn-ea"/>
+              </a:rPr>
+              <a:t>While total losses on both power flow duration are similar. However, the losses share between the DClink MOSFET (middle graph) and side MOSFET (bottom graph) are different for different power flow mode.</a:t>
+            </a:r>
+            <a:endParaRPr lang="en-US" sz="1000"/>
+          </a:p>
+          <a:p>
+            <a:endParaRPr lang="en-US" sz="1000"/>
+          </a:p>
+        </p:txBody>
+      </p:sp>
+      <p:pic>
+        <p:nvPicPr>
+          <p:cNvPr id="14" name="Picture 13"/>
+          <p:cNvPicPr>
+            <a:picLocks noChangeAspect="1"/>
+          </p:cNvPicPr>
+          <p:nvPr/>
+        </p:nvPicPr>
+        <p:blipFill>
+          <a:blip r:embed="rId3"/>
+          <a:stretch>
+            <a:fillRect/>
+          </a:stretch>
+        </p:blipFill>
+        <p:spPr>
+          <a:xfrm>
+            <a:off x="6830695" y="984885"/>
+            <a:ext cx="4523105" cy="5427345"/>
+          </a:xfrm>
+          <a:prstGeom prst="rect">
+            <a:avLst/>
+          </a:prstGeom>
+        </p:spPr>
+      </p:pic>
     </p:spTree>
   </p:cSld>
   <p:clrMapOvr>
@@ -6377,7 +8164,7 @@
         </p:nvGraphicFramePr>
         <p:xfrm>
           <a:off x="838200" y="1825625"/>
-          <a:ext cx="10515600" cy="1524000"/>
+          <a:ext cx="10515600" cy="3505200"/>
         </p:xfrm>
         <a:graphic>
           <a:graphicData uri="http://schemas.openxmlformats.org/drawingml/2006/table">
@@ -6565,6 +8352,40 @@
                   <a:tcPr/>
                 </a:tc>
               </a:tr>
+              <a:tr h="381000">
+                <a:tc>
+                  <a:txBody>
+                    <a:bodyPr/>
+                    <a:p>
+                      <a:pPr>
+                        <a:buNone/>
+                      </a:pPr>
+                      <a:r>
+                        <a:rPr lang="en-US"/>
+                        <a:t>Rev.4 @ 2026/02/24</a:t>
+                      </a:r>
+                      <a:endParaRPr lang="en-US"/>
+                    </a:p>
+                  </a:txBody>
+                  <a:tcPr/>
+                </a:tc>
+                <a:tc>
+                  <a:txBody>
+                    <a:bodyPr/>
+                    <a:p>
+                      <a:pPr>
+                        <a:buNone/>
+                      </a:pPr>
+                      <a:r>
+                        <a:rPr lang="en-US"/>
+                        <a:t>Now the mosfet losses data is using json for improved readability</a:t>
+                      </a:r>
+                      <a:endParaRPr lang="en-US"/>
+                    </a:p>
+                  </a:txBody>
+                  <a:tcPr/>
+                </a:tc>
+              </a:tr>
             </a:tbl>
           </a:graphicData>
         </a:graphic>
@@ -6885,7 +8706,7 @@
         <p:spPr>
           <a:xfrm>
             <a:off x="8153400" y="3674745"/>
-            <a:ext cx="3641090" cy="2014220"/>
+            <a:ext cx="3641090" cy="2275840"/>
           </a:xfrm>
           <a:prstGeom prst="rect">
             <a:avLst/>
@@ -6933,7 +8754,7 @@
             </a:pPr>
             <a:r>
               <a:rPr lang="en-US" sz="1400"/>
-              <a:t>max_prd 	= power loss timeout to force 	losses update if the elapsed time 	from latest update time to 	present time reach the max_prd</a:t>
+              <a:t>max_prd 	= power loss timeout to force 	    losses update if the elapsed time 	    from latest update time to 	    present time reach the max_prd</a:t>
             </a:r>
             <a:endParaRPr lang="en-US" sz="1400"/>
           </a:p>
@@ -6969,7 +8790,7 @@
             </a:pPr>
             <a:r>
               <a:rPr lang="en-US" sz="1400"/>
-              <a:t>fname	= losses table file name</a:t>
+              <a:t>fname	= MOSFET model name within 	    mosfet_loss_model.json</a:t>
             </a:r>
             <a:endParaRPr lang="en-US" sz="1400"/>
           </a:p>
@@ -6977,7 +8798,7 @@
       </p:sp>
       <p:pic>
         <p:nvPicPr>
-          <p:cNvPr id="10" name="Picture 9"/>
+          <p:cNvPr id="6" name="Picture 5"/>
           <p:cNvPicPr>
             <a:picLocks noChangeAspect="1"/>
           </p:cNvPicPr>
@@ -6991,12 +8812,17 @@
         </p:blipFill>
         <p:spPr>
           <a:xfrm>
-            <a:off x="8153400" y="1336040"/>
-            <a:ext cx="3641090" cy="1987550"/>
+            <a:off x="8521700" y="1198880"/>
+            <a:ext cx="3272790" cy="2261870"/>
           </a:xfrm>
           <a:prstGeom prst="rect">
             <a:avLst/>
           </a:prstGeom>
+          <a:ln w="19050">
+            <a:solidFill>
+              <a:srgbClr val="C00000"/>
+            </a:solidFill>
+          </a:ln>
         </p:spPr>
       </p:pic>
     </p:spTree>
@@ -9062,9 +10888,21 @@
           <a:p>
             <a:r>
               <a:rPr lang="en-US" dirty="0"/>
-              <a:t>Understanding the losses table format</a:t>
-            </a:r>
-            <a:endParaRPr lang="en-US" dirty="0"/>
+              <a:t>Understanding the </a:t>
+            </a:r>
+            <a:r>
+              <a:rPr lang="en-US" sz="4900" b="1" dirty="0">
+                <a:solidFill>
+                  <a:srgbClr val="FF0000"/>
+                </a:solidFill>
+              </a:rPr>
+              <a:t>mosfet_loss_model.json</a:t>
+            </a:r>
+            <a:endParaRPr lang="en-US" sz="4900" b="1" dirty="0">
+              <a:solidFill>
+                <a:srgbClr val="FF0000"/>
+              </a:solidFill>
+            </a:endParaRPr>
           </a:p>
         </p:txBody>
       </p:sp>
@@ -9215,806 +11053,6 @@
           </a:prstGeom>
         </p:spPr>
       </p:pic>
-      <p:graphicFrame>
-        <p:nvGraphicFramePr>
-          <p:cNvPr id="13" name="Table 12"/>
-          <p:cNvGraphicFramePr/>
-          <p:nvPr/>
-        </p:nvGraphicFramePr>
-        <p:xfrm>
-          <a:off x="880745" y="1157605"/>
-          <a:ext cx="8530590" cy="1920240"/>
-        </p:xfrm>
-        <a:graphic>
-          <a:graphicData uri="http://schemas.openxmlformats.org/drawingml/2006/table">
-            <a:tbl>
-              <a:tblPr>
-                <a:tableStyleId>{5C22544A-7EE6-4342-B048-85BDC9FD1C3A}</a:tableStyleId>
-              </a:tblPr>
-              <a:tblGrid>
-                <a:gridCol w="1188720"/>
-                <a:gridCol w="1188720"/>
-                <a:gridCol w="1188720"/>
-                <a:gridCol w="1188720"/>
-                <a:gridCol w="1188720"/>
-                <a:gridCol w="1188720"/>
-              </a:tblGrid>
-              <a:tr h="274320">
-                <a:tc>
-                  <a:txBody>
-                    <a:bodyPr/>
-                    <a:p>
-                      <a:pPr>
-                        <a:buNone/>
-                      </a:pPr>
-                      <a:r>
-                        <a:rPr lang="en-US" sz="1200">
-                          <a:latin typeface="Calibri" panose="020F0502020204030204" charset="0"/>
-                          <a:cs typeface="Calibri" panose="020F0502020204030204" charset="0"/>
-                        </a:rPr>
-                        <a:t>Rdson</a:t>
-                      </a:r>
-                      <a:endParaRPr lang="en-US" sz="1200">
-                        <a:latin typeface="Calibri" panose="020F0502020204030204" charset="0"/>
-                        <a:cs typeface="Calibri" panose="020F0502020204030204" charset="0"/>
-                      </a:endParaRPr>
-                    </a:p>
-                  </a:txBody>
-                  <a:tcPr/>
-                </a:tc>
-                <a:tc>
-                  <a:txBody>
-                    <a:bodyPr/>
-                    <a:p>
-                      <a:pPr>
-                        <a:buNone/>
-                      </a:pPr>
-                      <a:r>
-                        <a:rPr lang="en-US" sz="1200">
-                          <a:latin typeface="Calibri" panose="020F0502020204030204" charset="0"/>
-                          <a:cs typeface="Calibri" panose="020F0502020204030204" charset="0"/>
-                        </a:rPr>
-                        <a:t>Ton</a:t>
-                      </a:r>
-                      <a:endParaRPr lang="en-US" sz="1200">
-                        <a:latin typeface="Calibri" panose="020F0502020204030204" charset="0"/>
-                        <a:cs typeface="Calibri" panose="020F0502020204030204" charset="0"/>
-                      </a:endParaRPr>
-                    </a:p>
-                  </a:txBody>
-                  <a:tcPr/>
-                </a:tc>
-                <a:tc>
-                  <a:txBody>
-                    <a:bodyPr/>
-                    <a:p>
-                      <a:pPr>
-                        <a:buNone/>
-                      </a:pPr>
-                      <a:r>
-                        <a:rPr lang="en-US" sz="1200">
-                          <a:latin typeface="Calibri" panose="020F0502020204030204" charset="0"/>
-                          <a:cs typeface="Calibri" panose="020F0502020204030204" charset="0"/>
-                        </a:rPr>
-                        <a:t>Toff</a:t>
-                      </a:r>
-                      <a:endParaRPr lang="en-US" sz="1200">
-                        <a:latin typeface="Calibri" panose="020F0502020204030204" charset="0"/>
-                        <a:cs typeface="Calibri" panose="020F0502020204030204" charset="0"/>
-                      </a:endParaRPr>
-                    </a:p>
-                  </a:txBody>
-                  <a:tcPr/>
-                </a:tc>
-                <a:tc>
-                  <a:txBody>
-                    <a:bodyPr/>
-                    <a:p>
-                      <a:pPr>
-                        <a:buNone/>
-                      </a:pPr>
-                      <a:r>
-                        <a:rPr lang="en-US" sz="1200">
-                          <a:latin typeface="Calibri" panose="020F0502020204030204" charset="0"/>
-                          <a:cs typeface="Calibri" panose="020F0502020204030204" charset="0"/>
-                        </a:rPr>
-                        <a:t>Rg_test</a:t>
-                      </a:r>
-                      <a:endParaRPr lang="en-US" sz="1200">
-                        <a:latin typeface="Calibri" panose="020F0502020204030204" charset="0"/>
-                        <a:cs typeface="Calibri" panose="020F0502020204030204" charset="0"/>
-                      </a:endParaRPr>
-                    </a:p>
-                  </a:txBody>
-                  <a:tcPr/>
-                </a:tc>
-                <a:tc>
-                  <a:txBody>
-                    <a:bodyPr/>
-                    <a:p>
-                      <a:pPr>
-                        <a:buNone/>
-                      </a:pPr>
-                      <a:r>
-                        <a:rPr lang="en-US" sz="1200">
-                          <a:latin typeface="Calibri" panose="020F0502020204030204" charset="0"/>
-                          <a:cs typeface="Calibri" panose="020F0502020204030204" charset="0"/>
-                        </a:rPr>
-                        <a:t>Rg_int</a:t>
-                      </a:r>
-                      <a:endParaRPr lang="en-US" sz="1200">
-                        <a:latin typeface="Calibri" panose="020F0502020204030204" charset="0"/>
-                        <a:cs typeface="Calibri" panose="020F0502020204030204" charset="0"/>
-                      </a:endParaRPr>
-                    </a:p>
-                  </a:txBody>
-                  <a:tcPr/>
-                </a:tc>
-                <a:tc>
-                  <a:txBody>
-                    <a:bodyPr/>
-                    <a:p>
-                      <a:pPr>
-                        <a:buNone/>
-                      </a:pPr>
-                      <a:r>
-                        <a:rPr lang="en-US" sz="1200">
-                          <a:latin typeface="Calibri" panose="020F0502020204030204" charset="0"/>
-                          <a:cs typeface="Calibri" panose="020F0502020204030204" charset="0"/>
-                        </a:rPr>
-                        <a:t>0.0</a:t>
-                      </a:r>
-                      <a:endParaRPr lang="en-US" sz="1200">
-                        <a:latin typeface="Calibri" panose="020F0502020204030204" charset="0"/>
-                        <a:cs typeface="Calibri" panose="020F0502020204030204" charset="0"/>
-                      </a:endParaRPr>
-                    </a:p>
-                  </a:txBody>
-                  <a:tcPr/>
-                </a:tc>
-              </a:tr>
-              <a:tr h="274320">
-                <a:tc>
-                  <a:txBody>
-                    <a:bodyPr/>
-                    <a:p>
-                      <a:pPr>
-                        <a:buNone/>
-                      </a:pPr>
-                      <a:r>
-                        <a:rPr lang="en-US" sz="1200">
-                          <a:latin typeface="Calibri" panose="020F0502020204030204" charset="0"/>
-                          <a:cs typeface="Calibri" panose="020F0502020204030204" charset="0"/>
-                        </a:rPr>
-                        <a:t>Vds (0V)</a:t>
-                      </a:r>
-                      <a:endParaRPr lang="en-US" sz="1200">
-                        <a:latin typeface="Calibri" panose="020F0502020204030204" charset="0"/>
-                        <a:cs typeface="Calibri" panose="020F0502020204030204" charset="0"/>
-                      </a:endParaRPr>
-                    </a:p>
-                  </a:txBody>
-                  <a:tcPr/>
-                </a:tc>
-                <a:tc>
-                  <a:txBody>
-                    <a:bodyPr/>
-                    <a:p>
-                      <a:pPr>
-                        <a:buNone/>
-                      </a:pPr>
-                      <a:endParaRPr lang="en-US" sz="1200">
-                        <a:latin typeface="Calibri" panose="020F0502020204030204" charset="0"/>
-                        <a:cs typeface="Calibri" panose="020F0502020204030204" charset="0"/>
-                      </a:endParaRPr>
-                    </a:p>
-                  </a:txBody>
-                  <a:tcPr/>
-                </a:tc>
-                <a:tc>
-                  <a:txBody>
-                    <a:bodyPr/>
-                    <a:p>
-                      <a:pPr>
-                        <a:buNone/>
-                      </a:pPr>
-                      <a:endParaRPr lang="en-US" sz="1200">
-                        <a:latin typeface="Calibri" panose="020F0502020204030204" charset="0"/>
-                        <a:cs typeface="Calibri" panose="020F0502020204030204" charset="0"/>
-                      </a:endParaRPr>
-                    </a:p>
-                  </a:txBody>
-                  <a:tcPr/>
-                </a:tc>
-                <a:tc>
-                  <a:txBody>
-                    <a:bodyPr/>
-                    <a:p>
-                      <a:pPr>
-                        <a:buNone/>
-                      </a:pPr>
-                      <a:endParaRPr lang="en-US" sz="1200">
-                        <a:latin typeface="Calibri" panose="020F0502020204030204" charset="0"/>
-                        <a:cs typeface="Calibri" panose="020F0502020204030204" charset="0"/>
-                      </a:endParaRPr>
-                    </a:p>
-                  </a:txBody>
-                  <a:tcPr/>
-                </a:tc>
-                <a:tc>
-                  <a:txBody>
-                    <a:bodyPr/>
-                    <a:p>
-                      <a:pPr>
-                        <a:buNone/>
-                      </a:pPr>
-                      <a:endParaRPr lang="en-US" sz="1200">
-                        <a:latin typeface="Calibri" panose="020F0502020204030204" charset="0"/>
-                        <a:cs typeface="Calibri" panose="020F0502020204030204" charset="0"/>
-                      </a:endParaRPr>
-                    </a:p>
-                  </a:txBody>
-                  <a:tcPr/>
-                </a:tc>
-                <a:tc>
-                  <a:txBody>
-                    <a:bodyPr/>
-                    <a:p>
-                      <a:pPr>
-                        <a:buNone/>
-                      </a:pPr>
-                      <a:r>
-                        <a:rPr lang="en-US" sz="1200">
-                          <a:latin typeface="Calibri" panose="020F0502020204030204" charset="0"/>
-                          <a:cs typeface="Calibri" panose="020F0502020204030204" charset="0"/>
-                        </a:rPr>
-                        <a:t>Vds (Vrating)</a:t>
-                      </a:r>
-                      <a:endParaRPr lang="en-US" sz="1200">
-                        <a:latin typeface="Calibri" panose="020F0502020204030204" charset="0"/>
-                        <a:cs typeface="Calibri" panose="020F0502020204030204" charset="0"/>
-                      </a:endParaRPr>
-                    </a:p>
-                  </a:txBody>
-                  <a:tcPr/>
-                </a:tc>
-              </a:tr>
-              <a:tr h="274320">
-                <a:tc>
-                  <a:txBody>
-                    <a:bodyPr/>
-                    <a:p>
-                      <a:pPr>
-                        <a:buNone/>
-                      </a:pPr>
-                      <a:r>
-                        <a:rPr lang="en-US" sz="1200">
-                          <a:latin typeface="Calibri" panose="020F0502020204030204" charset="0"/>
-                          <a:cs typeface="Calibri" panose="020F0502020204030204" charset="0"/>
-                        </a:rPr>
-                        <a:t>Coss(@Vds)</a:t>
-                      </a:r>
-                      <a:endParaRPr lang="en-US" sz="1200">
-                        <a:latin typeface="Calibri" panose="020F0502020204030204" charset="0"/>
-                        <a:cs typeface="Calibri" panose="020F0502020204030204" charset="0"/>
-                      </a:endParaRPr>
-                    </a:p>
-                  </a:txBody>
-                  <a:tcPr/>
-                </a:tc>
-                <a:tc>
-                  <a:txBody>
-                    <a:bodyPr/>
-                    <a:p>
-                      <a:pPr>
-                        <a:buNone/>
-                      </a:pPr>
-                      <a:endParaRPr lang="en-US" sz="1200">
-                        <a:latin typeface="Calibri" panose="020F0502020204030204" charset="0"/>
-                        <a:cs typeface="Calibri" panose="020F0502020204030204" charset="0"/>
-                      </a:endParaRPr>
-                    </a:p>
-                  </a:txBody>
-                  <a:tcPr/>
-                </a:tc>
-                <a:tc>
-                  <a:txBody>
-                    <a:bodyPr/>
-                    <a:p>
-                      <a:pPr>
-                        <a:buNone/>
-                      </a:pPr>
-                      <a:endParaRPr lang="en-US" sz="1200">
-                        <a:latin typeface="Calibri" panose="020F0502020204030204" charset="0"/>
-                        <a:cs typeface="Calibri" panose="020F0502020204030204" charset="0"/>
-                      </a:endParaRPr>
-                    </a:p>
-                  </a:txBody>
-                  <a:tcPr/>
-                </a:tc>
-                <a:tc>
-                  <a:txBody>
-                    <a:bodyPr/>
-                    <a:p>
-                      <a:pPr>
-                        <a:buNone/>
-                      </a:pPr>
-                      <a:endParaRPr lang="en-US" sz="1200">
-                        <a:latin typeface="Calibri" panose="020F0502020204030204" charset="0"/>
-                        <a:cs typeface="Calibri" panose="020F0502020204030204" charset="0"/>
-                      </a:endParaRPr>
-                    </a:p>
-                  </a:txBody>
-                  <a:tcPr/>
-                </a:tc>
-                <a:tc>
-                  <a:txBody>
-                    <a:bodyPr/>
-                    <a:p>
-                      <a:pPr>
-                        <a:buNone/>
-                      </a:pPr>
-                      <a:endParaRPr lang="en-US" sz="1200">
-                        <a:latin typeface="Calibri" panose="020F0502020204030204" charset="0"/>
-                        <a:cs typeface="Calibri" panose="020F0502020204030204" charset="0"/>
-                      </a:endParaRPr>
-                    </a:p>
-                  </a:txBody>
-                  <a:tcPr/>
-                </a:tc>
-                <a:tc>
-                  <a:txBody>
-                    <a:bodyPr/>
-                    <a:p>
-                      <a:pPr>
-                        <a:buNone/>
-                      </a:pPr>
-                      <a:r>
-                        <a:rPr lang="en-US" sz="1200">
-                          <a:latin typeface="Calibri" panose="020F0502020204030204" charset="0"/>
-                          <a:cs typeface="Calibri" panose="020F0502020204030204" charset="0"/>
-                        </a:rPr>
-                        <a:t>Coss(@Vds)</a:t>
-                      </a:r>
-                      <a:endParaRPr lang="en-US" sz="1200">
-                        <a:latin typeface="Calibri" panose="020F0502020204030204" charset="0"/>
-                        <a:cs typeface="Calibri" panose="020F0502020204030204" charset="0"/>
-                      </a:endParaRPr>
-                    </a:p>
-                  </a:txBody>
-                  <a:tcPr/>
-                </a:tc>
-              </a:tr>
-              <a:tr h="274320">
-                <a:tc>
-                  <a:txBody>
-                    <a:bodyPr/>
-                    <a:p>
-                      <a:pPr>
-                        <a:buNone/>
-                      </a:pPr>
-                      <a:r>
-                        <a:rPr lang="en-US" sz="1200">
-                          <a:latin typeface="Calibri" panose="020F0502020204030204" charset="0"/>
-                          <a:cs typeface="Calibri" panose="020F0502020204030204" charset="0"/>
-                        </a:rPr>
-                        <a:t>Isd (0A)</a:t>
-                      </a:r>
-                      <a:endParaRPr lang="en-US" sz="1200">
-                        <a:latin typeface="Calibri" panose="020F0502020204030204" charset="0"/>
-                        <a:cs typeface="Calibri" panose="020F0502020204030204" charset="0"/>
-                      </a:endParaRPr>
-                    </a:p>
-                  </a:txBody>
-                  <a:tcPr/>
-                </a:tc>
-                <a:tc>
-                  <a:txBody>
-                    <a:bodyPr/>
-                    <a:p>
-                      <a:pPr>
-                        <a:buNone/>
-                      </a:pPr>
-                      <a:endParaRPr lang="en-US" sz="1200">
-                        <a:latin typeface="Calibri" panose="020F0502020204030204" charset="0"/>
-                        <a:cs typeface="Calibri" panose="020F0502020204030204" charset="0"/>
-                      </a:endParaRPr>
-                    </a:p>
-                  </a:txBody>
-                  <a:tcPr/>
-                </a:tc>
-                <a:tc>
-                  <a:txBody>
-                    <a:bodyPr/>
-                    <a:p>
-                      <a:pPr>
-                        <a:buNone/>
-                      </a:pPr>
-                      <a:endParaRPr lang="en-US" sz="1200">
-                        <a:latin typeface="Calibri" panose="020F0502020204030204" charset="0"/>
-                        <a:cs typeface="Calibri" panose="020F0502020204030204" charset="0"/>
-                      </a:endParaRPr>
-                    </a:p>
-                  </a:txBody>
-                  <a:tcPr/>
-                </a:tc>
-                <a:tc>
-                  <a:txBody>
-                    <a:bodyPr/>
-                    <a:p>
-                      <a:pPr>
-                        <a:buNone/>
-                      </a:pPr>
-                      <a:endParaRPr lang="en-US" sz="1200">
-                        <a:latin typeface="Calibri" panose="020F0502020204030204" charset="0"/>
-                        <a:cs typeface="Calibri" panose="020F0502020204030204" charset="0"/>
-                      </a:endParaRPr>
-                    </a:p>
-                  </a:txBody>
-                  <a:tcPr/>
-                </a:tc>
-                <a:tc>
-                  <a:txBody>
-                    <a:bodyPr/>
-                    <a:p>
-                      <a:pPr>
-                        <a:buNone/>
-                      </a:pPr>
-                      <a:endParaRPr lang="en-US" sz="1200">
-                        <a:latin typeface="Calibri" panose="020F0502020204030204" charset="0"/>
-                        <a:cs typeface="Calibri" panose="020F0502020204030204" charset="0"/>
-                      </a:endParaRPr>
-                    </a:p>
-                  </a:txBody>
-                  <a:tcPr/>
-                </a:tc>
-                <a:tc>
-                  <a:txBody>
-                    <a:bodyPr/>
-                    <a:p>
-                      <a:pPr>
-                        <a:buNone/>
-                      </a:pPr>
-                      <a:r>
-                        <a:rPr lang="en-US" sz="1200">
-                          <a:latin typeface="Calibri" panose="020F0502020204030204" charset="0"/>
-                          <a:cs typeface="Calibri" panose="020F0502020204030204" charset="0"/>
-                        </a:rPr>
-                        <a:t>Isd (Irating)</a:t>
-                      </a:r>
-                      <a:endParaRPr lang="en-US" sz="1200">
-                        <a:latin typeface="Calibri" panose="020F0502020204030204" charset="0"/>
-                        <a:cs typeface="Calibri" panose="020F0502020204030204" charset="0"/>
-                      </a:endParaRPr>
-                    </a:p>
-                  </a:txBody>
-                  <a:tcPr/>
-                </a:tc>
-              </a:tr>
-              <a:tr h="274320">
-                <a:tc>
-                  <a:txBody>
-                    <a:bodyPr/>
-                    <a:p>
-                      <a:pPr>
-                        <a:buNone/>
-                      </a:pPr>
-                      <a:r>
-                        <a:rPr lang="en-US" sz="1200">
-                          <a:latin typeface="Calibri" panose="020F0502020204030204" charset="0"/>
-                          <a:cs typeface="Calibri" panose="020F0502020204030204" charset="0"/>
-                        </a:rPr>
-                        <a:t>Vsd(@Isd)</a:t>
-                      </a:r>
-                      <a:endParaRPr lang="en-US" sz="1200">
-                        <a:latin typeface="Calibri" panose="020F0502020204030204" charset="0"/>
-                        <a:cs typeface="Calibri" panose="020F0502020204030204" charset="0"/>
-                      </a:endParaRPr>
-                    </a:p>
-                  </a:txBody>
-                  <a:tcPr/>
-                </a:tc>
-                <a:tc>
-                  <a:txBody>
-                    <a:bodyPr/>
-                    <a:p>
-                      <a:pPr>
-                        <a:buNone/>
-                      </a:pPr>
-                      <a:endParaRPr lang="en-US" sz="1200">
-                        <a:latin typeface="Calibri" panose="020F0502020204030204" charset="0"/>
-                        <a:cs typeface="Calibri" panose="020F0502020204030204" charset="0"/>
-                      </a:endParaRPr>
-                    </a:p>
-                  </a:txBody>
-                  <a:tcPr/>
-                </a:tc>
-                <a:tc>
-                  <a:txBody>
-                    <a:bodyPr/>
-                    <a:p>
-                      <a:pPr>
-                        <a:buNone/>
-                      </a:pPr>
-                      <a:endParaRPr lang="en-US" sz="1200">
-                        <a:latin typeface="Calibri" panose="020F0502020204030204" charset="0"/>
-                        <a:cs typeface="Calibri" panose="020F0502020204030204" charset="0"/>
-                      </a:endParaRPr>
-                    </a:p>
-                  </a:txBody>
-                  <a:tcPr/>
-                </a:tc>
-                <a:tc>
-                  <a:txBody>
-                    <a:bodyPr/>
-                    <a:p>
-                      <a:pPr>
-                        <a:buNone/>
-                      </a:pPr>
-                      <a:endParaRPr lang="en-US" sz="1200">
-                        <a:latin typeface="Calibri" panose="020F0502020204030204" charset="0"/>
-                        <a:cs typeface="Calibri" panose="020F0502020204030204" charset="0"/>
-                      </a:endParaRPr>
-                    </a:p>
-                  </a:txBody>
-                  <a:tcPr/>
-                </a:tc>
-                <a:tc>
-                  <a:txBody>
-                    <a:bodyPr/>
-                    <a:p>
-                      <a:pPr>
-                        <a:buNone/>
-                      </a:pPr>
-                      <a:endParaRPr lang="en-US" sz="1200">
-                        <a:latin typeface="Calibri" panose="020F0502020204030204" charset="0"/>
-                        <a:cs typeface="Calibri" panose="020F0502020204030204" charset="0"/>
-                      </a:endParaRPr>
-                    </a:p>
-                  </a:txBody>
-                  <a:tcPr/>
-                </a:tc>
-                <a:tc>
-                  <a:txBody>
-                    <a:bodyPr/>
-                    <a:p>
-                      <a:pPr>
-                        <a:buNone/>
-                      </a:pPr>
-                      <a:r>
-                        <a:rPr lang="en-US" sz="1200">
-                          <a:latin typeface="Calibri" panose="020F0502020204030204" charset="0"/>
-                          <a:cs typeface="Calibri" panose="020F0502020204030204" charset="0"/>
-                          <a:sym typeface="+mn-ea"/>
-                        </a:rPr>
-                        <a:t>Vsd(@Isd)</a:t>
-                      </a:r>
-                      <a:endParaRPr lang="en-US" sz="1200">
-                        <a:latin typeface="Calibri" panose="020F0502020204030204" charset="0"/>
-                        <a:cs typeface="Calibri" panose="020F0502020204030204" charset="0"/>
-                        <a:sym typeface="+mn-ea"/>
-                      </a:endParaRPr>
-                    </a:p>
-                  </a:txBody>
-                  <a:tcPr/>
-                </a:tc>
-              </a:tr>
-              <a:tr h="274320">
-                <a:tc>
-                  <a:txBody>
-                    <a:bodyPr/>
-                    <a:p>
-                      <a:pPr>
-                        <a:buNone/>
-                      </a:pPr>
-                      <a:r>
-                        <a:rPr lang="en-US" sz="1200">
-                          <a:latin typeface="Calibri" panose="020F0502020204030204" charset="0"/>
-                          <a:cs typeface="Calibri" panose="020F0502020204030204" charset="0"/>
-                        </a:rPr>
-                        <a:t>Tj,min (⁰C)</a:t>
-                      </a:r>
-                      <a:endParaRPr lang="en-US" sz="1200">
-                        <a:latin typeface="Calibri" panose="020F0502020204030204" charset="0"/>
-                        <a:cs typeface="Calibri" panose="020F0502020204030204" charset="0"/>
-                      </a:endParaRPr>
-                    </a:p>
-                  </a:txBody>
-                  <a:tcPr/>
-                </a:tc>
-                <a:tc>
-                  <a:txBody>
-                    <a:bodyPr/>
-                    <a:p>
-                      <a:pPr>
-                        <a:buNone/>
-                      </a:pPr>
-                      <a:endParaRPr lang="en-US" sz="1200">
-                        <a:latin typeface="Calibri" panose="020F0502020204030204" charset="0"/>
-                        <a:cs typeface="Calibri" panose="020F0502020204030204" charset="0"/>
-                      </a:endParaRPr>
-                    </a:p>
-                  </a:txBody>
-                  <a:tcPr/>
-                </a:tc>
-                <a:tc>
-                  <a:txBody>
-                    <a:bodyPr/>
-                    <a:p>
-                      <a:pPr>
-                        <a:buNone/>
-                      </a:pPr>
-                      <a:endParaRPr lang="en-US" sz="1200">
-                        <a:latin typeface="Calibri" panose="020F0502020204030204" charset="0"/>
-                        <a:cs typeface="Calibri" panose="020F0502020204030204" charset="0"/>
-                      </a:endParaRPr>
-                    </a:p>
-                  </a:txBody>
-                  <a:tcPr/>
-                </a:tc>
-                <a:tc>
-                  <a:txBody>
-                    <a:bodyPr/>
-                    <a:p>
-                      <a:pPr>
-                        <a:buNone/>
-                      </a:pPr>
-                      <a:endParaRPr lang="en-US" sz="1200">
-                        <a:latin typeface="Calibri" panose="020F0502020204030204" charset="0"/>
-                        <a:cs typeface="Calibri" panose="020F0502020204030204" charset="0"/>
-                      </a:endParaRPr>
-                    </a:p>
-                  </a:txBody>
-                  <a:tcPr/>
-                </a:tc>
-                <a:tc>
-                  <a:txBody>
-                    <a:bodyPr/>
-                    <a:p>
-                      <a:pPr>
-                        <a:buNone/>
-                      </a:pPr>
-                      <a:endParaRPr lang="en-US" sz="1200">
-                        <a:latin typeface="Calibri" panose="020F0502020204030204" charset="0"/>
-                        <a:cs typeface="Calibri" panose="020F0502020204030204" charset="0"/>
-                      </a:endParaRPr>
-                    </a:p>
-                  </a:txBody>
-                  <a:tcPr/>
-                </a:tc>
-                <a:tc>
-                  <a:txBody>
-                    <a:bodyPr/>
-                    <a:p>
-                      <a:pPr>
-                        <a:buNone/>
-                      </a:pPr>
-                      <a:r>
-                        <a:rPr lang="en-US" sz="1200">
-                          <a:latin typeface="Calibri" panose="020F0502020204030204" charset="0"/>
-                          <a:cs typeface="Calibri" panose="020F0502020204030204" charset="0"/>
-                        </a:rPr>
-                        <a:t>Tj,min (⁰C)</a:t>
-                      </a:r>
-                      <a:endParaRPr lang="en-US" sz="1200">
-                        <a:latin typeface="Calibri" panose="020F0502020204030204" charset="0"/>
-                        <a:cs typeface="Calibri" panose="020F0502020204030204" charset="0"/>
-                      </a:endParaRPr>
-                    </a:p>
-                  </a:txBody>
-                  <a:tcPr/>
-                </a:tc>
-              </a:tr>
-              <a:tr h="274320">
-                <a:tc>
-                  <a:txBody>
-                    <a:bodyPr/>
-                    <a:p>
-                      <a:pPr>
-                        <a:buNone/>
-                      </a:pPr>
-                      <a:r>
-                        <a:rPr lang="en-US" sz="1200">
-                          <a:latin typeface="Calibri" panose="020F0502020204030204" charset="0"/>
-                          <a:cs typeface="Calibri" panose="020F0502020204030204" charset="0"/>
-                        </a:rPr>
-                        <a:t>Rds_factor</a:t>
-                      </a:r>
-                      <a:endParaRPr lang="en-US" sz="1200">
-                        <a:latin typeface="Calibri" panose="020F0502020204030204" charset="0"/>
-                        <a:cs typeface="Calibri" panose="020F0502020204030204" charset="0"/>
-                      </a:endParaRPr>
-                    </a:p>
-                  </a:txBody>
-                  <a:tcPr/>
-                </a:tc>
-                <a:tc>
-                  <a:txBody>
-                    <a:bodyPr/>
-                    <a:p>
-                      <a:pPr>
-                        <a:buNone/>
-                      </a:pPr>
-                      <a:endParaRPr lang="en-US" sz="1200">
-                        <a:latin typeface="Calibri" panose="020F0502020204030204" charset="0"/>
-                        <a:cs typeface="Calibri" panose="020F0502020204030204" charset="0"/>
-                      </a:endParaRPr>
-                    </a:p>
-                  </a:txBody>
-                  <a:tcPr/>
-                </a:tc>
-                <a:tc>
-                  <a:txBody>
-                    <a:bodyPr/>
-                    <a:p>
-                      <a:pPr>
-                        <a:buNone/>
-                      </a:pPr>
-                      <a:endParaRPr lang="en-US" sz="1200">
-                        <a:latin typeface="Calibri" panose="020F0502020204030204" charset="0"/>
-                        <a:cs typeface="Calibri" panose="020F0502020204030204" charset="0"/>
-                      </a:endParaRPr>
-                    </a:p>
-                  </a:txBody>
-                  <a:tcPr/>
-                </a:tc>
-                <a:tc>
-                  <a:txBody>
-                    <a:bodyPr/>
-                    <a:p>
-                      <a:pPr>
-                        <a:buNone/>
-                      </a:pPr>
-                      <a:endParaRPr lang="en-US" sz="1200">
-                        <a:latin typeface="Calibri" panose="020F0502020204030204" charset="0"/>
-                        <a:cs typeface="Calibri" panose="020F0502020204030204" charset="0"/>
-                      </a:endParaRPr>
-                    </a:p>
-                  </a:txBody>
-                  <a:tcPr/>
-                </a:tc>
-                <a:tc>
-                  <a:txBody>
-                    <a:bodyPr/>
-                    <a:p>
-                      <a:pPr>
-                        <a:buNone/>
-                      </a:pPr>
-                      <a:endParaRPr lang="en-US" sz="1200">
-                        <a:latin typeface="Calibri" panose="020F0502020204030204" charset="0"/>
-                        <a:cs typeface="Calibri" panose="020F0502020204030204" charset="0"/>
-                      </a:endParaRPr>
-                    </a:p>
-                  </a:txBody>
-                  <a:tcPr/>
-                </a:tc>
-                <a:tc>
-                  <a:txBody>
-                    <a:bodyPr/>
-                    <a:p>
-                      <a:pPr>
-                        <a:buNone/>
-                      </a:pPr>
-                      <a:r>
-                        <a:rPr lang="en-US" sz="1200">
-                          <a:latin typeface="Calibri" panose="020F0502020204030204" charset="0"/>
-                          <a:cs typeface="Calibri" panose="020F0502020204030204" charset="0"/>
-                        </a:rPr>
-                        <a:t>Rds_factor</a:t>
-                      </a:r>
-                      <a:endParaRPr lang="en-US" sz="1200">
-                        <a:latin typeface="Calibri" panose="020F0502020204030204" charset="0"/>
-                        <a:cs typeface="Calibri" panose="020F0502020204030204" charset="0"/>
-                      </a:endParaRPr>
-                    </a:p>
-                  </a:txBody>
-                  <a:tcPr/>
-                </a:tc>
-              </a:tr>
-            </a:tbl>
-          </a:graphicData>
-        </a:graphic>
-      </p:graphicFrame>
       <p:sp>
         <p:nvSpPr>
           <p:cNvPr id="26" name="Text Box 25"/>
@@ -10023,8 +11061,8 @@
         </p:nvSpPr>
         <p:spPr>
           <a:xfrm>
-            <a:off x="6968490" y="3428365"/>
-            <a:ext cx="4839970" cy="3138170"/>
+            <a:off x="6513830" y="1188720"/>
+            <a:ext cx="4839970" cy="4799965"/>
           </a:xfrm>
           <a:prstGeom prst="rect">
             <a:avLst/>
@@ -10042,7 +11080,7 @@
             </a:pPr>
             <a:r>
               <a:rPr lang="en-US"/>
-              <a:t>The table size must be strictly 7x6 and written with the exact format.</a:t>
+              <a:t>The mosfet_loss_model.json is now used instead of the older csv format to improve the data readability and also help the user to put various MOSFET model into a single library file.</a:t>
             </a:r>
             <a:endParaRPr lang="en-US"/>
           </a:p>
@@ -10051,10 +11089,6 @@
               <a:buFont typeface="Arial" panose="020B0604020202020204" pitchFamily="34" charset="0"/>
               <a:buChar char="•"/>
             </a:pPr>
-            <a:r>
-              <a:rPr lang="en-US"/>
-              <a:t>Between one collumn to the next, the data is separated by using tab (tab delimited data).</a:t>
-            </a:r>
             <a:endParaRPr lang="en-US"/>
           </a:p>
           <a:p>
@@ -10064,7 +11098,7 @@
             </a:pPr>
             <a:r>
               <a:rPr lang="en-US"/>
-              <a:t>The losses Eoss and body diode are calculated by taking linear interpolation from the losses table. </a:t>
+              <a:t>The losses for Eoss, body diode, and thermal scaling for Rdson are calculated by taking linear interpolation from the losses table. </a:t>
             </a:r>
             <a:r>
               <a:rPr lang="en-US" b="1"/>
@@ -10072,7 +11106,43 @@
             </a:r>
             <a:r>
               <a:rPr lang="en-US"/>
-              <a:t>. If the Vds or Id is greater than the highest value in the datasheet, the Eoss and Vsd are assumed to be equal to the maximum value on the table.</a:t>
+              <a:t>.</a:t>
+            </a:r>
+            <a:endParaRPr lang="en-US"/>
+          </a:p>
+          <a:p>
+            <a:pPr marL="285750" indent="-285750">
+              <a:buFont typeface="Arial" panose="020B0604020202020204" pitchFamily="34" charset="0"/>
+              <a:buChar char="•"/>
+            </a:pPr>
+            <a:endParaRPr lang="en-US"/>
+          </a:p>
+          <a:p>
+            <a:pPr marL="285750" indent="-285750">
+              <a:buFont typeface="Arial" panose="020B0604020202020204" pitchFamily="34" charset="0"/>
+              <a:buChar char="•"/>
+            </a:pPr>
+            <a:r>
+              <a:rPr lang="en-US"/>
+              <a:t>For Eoss and body diode, If the Vds or Id is greater than the highest value in the datasheet, the Eoss and Vsd are clamped to the maximum value on the table.</a:t>
+            </a:r>
+            <a:endParaRPr lang="en-US"/>
+          </a:p>
+          <a:p>
+            <a:pPr marL="285750" indent="-285750">
+              <a:buFont typeface="Arial" panose="020B0604020202020204" pitchFamily="34" charset="0"/>
+              <a:buChar char="•"/>
+            </a:pPr>
+            <a:endParaRPr lang="en-US"/>
+          </a:p>
+          <a:p>
+            <a:pPr marL="285750" indent="-285750">
+              <a:buFont typeface="Arial" panose="020B0604020202020204" pitchFamily="34" charset="0"/>
+              <a:buChar char="•"/>
+            </a:pPr>
+            <a:r>
+              <a:rPr lang="en-US"/>
+              <a:t>Ensure the mosfet_loss_model.json is available at the same directory as the Qsch file!</a:t>
             </a:r>
             <a:endParaRPr lang="en-US"/>
           </a:p>
@@ -10080,7 +11150,7 @@
       </p:sp>
       <p:pic>
         <p:nvPicPr>
-          <p:cNvPr id="10" name="Picture 9"/>
+          <p:cNvPr id="2" name="Picture 1"/>
           <p:cNvPicPr>
             <a:picLocks noChangeAspect="1"/>
           </p:cNvPicPr>
@@ -10088,18 +11158,24 @@
         </p:nvPicPr>
         <p:blipFill>
           <a:blip r:embed="rId2"/>
+          <a:srcRect t="444"/>
           <a:stretch>
             <a:fillRect/>
           </a:stretch>
         </p:blipFill>
         <p:spPr>
           <a:xfrm>
-            <a:off x="880745" y="3192145"/>
-            <a:ext cx="5792470" cy="2911475"/>
+            <a:off x="817245" y="1188720"/>
+            <a:ext cx="4867275" cy="4746625"/>
           </a:xfrm>
           <a:prstGeom prst="rect">
             <a:avLst/>
           </a:prstGeom>
+          <a:ln w="19050">
+            <a:solidFill>
+              <a:srgbClr val="C00000"/>
+            </a:solidFill>
+          </a:ln>
         </p:spPr>
       </p:pic>
     </p:spTree>
@@ -10151,7 +11227,16 @@
           <a:p>
             <a:r>
               <a:rPr lang="en-US" dirty="0"/>
-              <a:t>Reasoning for losses table design</a:t>
+              <a:t>Reasoning for </a:t>
+            </a:r>
+            <a:r>
+              <a:rPr lang="en-US" b="1" dirty="0">
+                <a:solidFill>
+                  <a:srgbClr val="FF0000"/>
+                </a:solidFill>
+                <a:sym typeface="+mn-ea"/>
+              </a:rPr>
+              <a:t>mosfet_loss_model.json</a:t>
             </a:r>
             <a:endParaRPr lang="en-US" dirty="0"/>
           </a:p>
@@ -10327,7 +11412,7 @@
           <a:p>
             <a:r>
               <a:rPr lang="en-US" sz="1400"/>
-              <a:t>The losses table used in this design is much simpler than the table used by PLECS. The reasoning why this table might be reasonably acceptable is because the more complex table is still a simple approximation as it only based on measurement with one gate resistance value, one or a few V</a:t>
+              <a:t>The losses model used in this design is much simpler than the table used by PLECS. The reasoning why this table might be reasonably acceptable is because the more complex table is still a simple approximation as it only based on measurement with one gate resistance value, one or a few V</a:t>
             </a:r>
             <a:r>
               <a:rPr lang="en-US" sz="1400" baseline="-25000"/>

</xml_diff>